<commit_message>
feat: implement dictionary sidebar and advanced navigation logic
- Layout: Added Sidebar component with institutional branding and navigation between Dictionary, Presentation, and Credits.
- Navigation: Implemented smart split-logic in EntryCard to resolve multi-word references like platano verde when exact matches do not exist.
- Search: Integrated gender expansion logic in useDictionary to support variants such as bacana or pifiada.
- UI: Added dynamic copyright year and localized line breaks in global footer.
- Icons: Replaced text plus signs with ArrowUpRight icons for intuitive cross-references.
- Data: Applied alphabetical reordering to caldo subentries and cleaned digits from link text.
</commit_message>
<xml_diff>
--- a/correcciones002.pptx
+++ b/correcciones002.pptx
@@ -150,7 +150,7 @@
       </p:grpSpPr>
       <p:sp>
         <p:nvSpPr>
-          <p:cNvPr id="1476424075" name="Marcador de encabezado 1"/>
+          <p:cNvPr id="388540295" name="Marcador de encabezado 1"/>
           <p:cNvSpPr>
             <a:spLocks noGrp="1"/>
           </p:cNvSpPr>
@@ -184,7 +184,7 @@
       </p:sp>
       <p:sp>
         <p:nvSpPr>
-          <p:cNvPr id="1728297932" name="Marcador de fecha 2"/>
+          <p:cNvPr id="1886256426" name="Marcador de fecha 2"/>
           <p:cNvSpPr>
             <a:spLocks noGrp="1"/>
           </p:cNvSpPr>
@@ -222,7 +222,7 @@
       </p:sp>
       <p:sp>
         <p:nvSpPr>
-          <p:cNvPr id="1691761667" name="Marcador de imagen de diapositiva 3"/>
+          <p:cNvPr id="1249699954" name="Marcador de imagen de diapositiva 3"/>
           <p:cNvSpPr>
             <a:spLocks noChangeAspect="1" noGrp="1" noRot="1"/>
           </p:cNvSpPr>
@@ -258,7 +258,7 @@
       </p:sp>
       <p:sp>
         <p:nvSpPr>
-          <p:cNvPr id="1307528157" name="Marcador de notas 4"/>
+          <p:cNvPr id="530179095" name="Marcador de notas 4"/>
           <p:cNvSpPr>
             <a:spLocks noGrp="1"/>
           </p:cNvSpPr>
@@ -332,7 +332,7 @@
       </p:sp>
       <p:sp>
         <p:nvSpPr>
-          <p:cNvPr id="406573721" name="Marcador de pie de página 5"/>
+          <p:cNvPr id="2012765634" name="Marcador de pie de página 5"/>
           <p:cNvSpPr>
             <a:spLocks noGrp="1"/>
           </p:cNvSpPr>
@@ -366,7 +366,7 @@
       </p:sp>
       <p:sp>
         <p:nvSpPr>
-          <p:cNvPr id="1147144469" name="Marcador de número de diapositiva 6"/>
+          <p:cNvPr id="833077567" name="Marcador de número de diapositiva 6"/>
           <p:cNvSpPr>
             <a:spLocks noGrp="1"/>
           </p:cNvSpPr>
@@ -519,7 +519,7 @@
       </p:grpSpPr>
       <p:sp>
         <p:nvSpPr>
-          <p:cNvPr id="1421969856" name="Marcador de imagen de diapositiva 1"/>
+          <p:cNvPr id="406911677" name="Slide Image Placeholder 1"/>
           <p:cNvSpPr>
             <a:spLocks noChangeAspect="1" noGrp="1" noRot="1"/>
           </p:cNvSpPr>
@@ -527,16 +527,11 @@
             <p:ph type="sldImg"/>
           </p:nvPr>
         </p:nvSpPr>
-        <p:spPr bwMode="auto">
-          <a:xfrm>
-            <a:off x="685800" y="1143000"/>
-            <a:ext cx="5486400" cy="3086100"/>
-          </a:xfrm>
-        </p:spPr>
-      </p:sp>
-      <p:sp>
-        <p:nvSpPr>
-          <p:cNvPr id="494385796" name="Marcador de notas 4"/>
+        <p:spPr bwMode="auto"/>
+      </p:sp>
+      <p:sp>
+        <p:nvSpPr>
+          <p:cNvPr id="209053119" name="Notes Placeholder 2"/>
           <p:cNvSpPr>
             <a:spLocks noGrp="1"/>
           </p:cNvSpPr>
@@ -552,16 +547,13 @@
             <a:pPr>
               <a:defRPr/>
             </a:pPr>
-            <a:endParaRPr lang="es-ES">
-              <a:latin typeface="Arial"/>
-              <a:cs typeface="Arial"/>
-            </a:endParaRPr>
-          </a:p>
-        </p:txBody>
-      </p:sp>
-      <p:sp>
-        <p:nvSpPr>
-          <p:cNvPr id="569384441" name="Marcador de número de diapositiva 3"/>
+            <a:endParaRPr/>
+          </a:p>
+        </p:txBody>
+      </p:sp>
+      <p:sp>
+        <p:nvSpPr>
+          <p:cNvPr id="244450355" name="Slide Number Placeholder 3"/>
           <p:cNvSpPr>
             <a:spLocks noGrp="1"/>
           </p:cNvSpPr>
@@ -577,11 +569,11 @@
             <a:pPr>
               <a:defRPr/>
             </a:pPr>
-            <a:fld id="{2E6999B8-B6B4-4561-A3CD-BBCDAB9FC9D9}" type="slidenum">
-              <a:rPr lang="es-ES"/>
-              <a:t>1</a:t>
+            <a:fld id="{CA259A46-31E6-B907-3ADF-671DF83D2EA8}" type="slidenum">
+              <a:rPr/>
+              <a:t/>
             </a:fld>
-            <a:endParaRPr lang="es-ES"/>
+            <a:endParaRPr/>
           </a:p>
         </p:txBody>
       </p:sp>
@@ -612,7 +604,7 @@
       </p:grpSpPr>
       <p:sp>
         <p:nvSpPr>
-          <p:cNvPr id="10665103" name="Slide Image Placeholder 1"/>
+          <p:cNvPr id="801758643" name="Slide Image Placeholder 1"/>
           <p:cNvSpPr>
             <a:spLocks noChangeAspect="1" noGrp="1" noRot="1"/>
           </p:cNvSpPr>
@@ -624,7 +616,7 @@
       </p:sp>
       <p:sp>
         <p:nvSpPr>
-          <p:cNvPr id="1241455478" name="Notes Placeholder 2"/>
+          <p:cNvPr id="849713623" name="Notes Placeholder 2"/>
           <p:cNvSpPr>
             <a:spLocks noGrp="1"/>
           </p:cNvSpPr>
@@ -646,7 +638,7 @@
       </p:sp>
       <p:sp>
         <p:nvSpPr>
-          <p:cNvPr id="942251694" name="Slide Number Placeholder 3"/>
+          <p:cNvPr id="1887297265" name="Slide Number Placeholder 3"/>
           <p:cNvSpPr>
             <a:spLocks noGrp="1"/>
           </p:cNvSpPr>
@@ -662,7 +654,7 @@
             <a:pPr>
               <a:defRPr/>
             </a:pPr>
-            <a:fld id="{D98D482A-F057-494B-B24F-98EABBE8A51E}" type="slidenum">
+            <a:fld id="{C80DC00A-A7ED-C3A1-7809-67559FF1A70F}" type="slidenum">
               <a:rPr/>
               <a:t/>
             </a:fld>
@@ -697,7 +689,7 @@
       </p:grpSpPr>
       <p:sp>
         <p:nvSpPr>
-          <p:cNvPr id="1247385882" name="Slide Image Placeholder 1"/>
+          <p:cNvPr id="647941804" name="Slide Image Placeholder 1"/>
           <p:cNvSpPr>
             <a:spLocks noChangeAspect="1" noGrp="1" noRot="1"/>
           </p:cNvSpPr>
@@ -709,7 +701,7 @@
       </p:sp>
       <p:sp>
         <p:nvSpPr>
-          <p:cNvPr id="462998195" name="Notes Placeholder 2"/>
+          <p:cNvPr id="2037544525" name="Notes Placeholder 2"/>
           <p:cNvSpPr>
             <a:spLocks noGrp="1"/>
           </p:cNvSpPr>
@@ -731,7 +723,7 @@
       </p:sp>
       <p:sp>
         <p:nvSpPr>
-          <p:cNvPr id="1157917242" name="Slide Number Placeholder 3"/>
+          <p:cNvPr id="1806989687" name="Slide Number Placeholder 3"/>
           <p:cNvSpPr>
             <a:spLocks noGrp="1"/>
           </p:cNvSpPr>
@@ -782,7 +774,7 @@
       </p:grpSpPr>
       <p:sp>
         <p:nvSpPr>
-          <p:cNvPr id="707813625" name="Slide Image Placeholder 1"/>
+          <p:cNvPr id="2083946504" name="Slide Image Placeholder 1"/>
           <p:cNvSpPr>
             <a:spLocks noChangeAspect="1" noGrp="1" noRot="1"/>
           </p:cNvSpPr>
@@ -794,7 +786,7 @@
       </p:sp>
       <p:sp>
         <p:nvSpPr>
-          <p:cNvPr id="2146387068" name="Notes Placeholder 2"/>
+          <p:cNvPr id="948370879" name="Notes Placeholder 2"/>
           <p:cNvSpPr>
             <a:spLocks noGrp="1"/>
           </p:cNvSpPr>
@@ -816,7 +808,7 @@
       </p:sp>
       <p:sp>
         <p:nvSpPr>
-          <p:cNvPr id="274240182" name="Slide Number Placeholder 3"/>
+          <p:cNvPr id="1549719610" name="Slide Number Placeholder 3"/>
           <p:cNvSpPr>
             <a:spLocks noGrp="1"/>
           </p:cNvSpPr>
@@ -867,7 +859,7 @@
       </p:grpSpPr>
       <p:sp>
         <p:nvSpPr>
-          <p:cNvPr id="501932538" name="Slide Image Placeholder 1"/>
+          <p:cNvPr id="180820717" name="Slide Image Placeholder 1"/>
           <p:cNvSpPr>
             <a:spLocks noChangeAspect="1" noGrp="1" noRot="1"/>
           </p:cNvSpPr>
@@ -879,7 +871,7 @@
       </p:sp>
       <p:sp>
         <p:nvSpPr>
-          <p:cNvPr id="1526980678" name="Notes Placeholder 2"/>
+          <p:cNvPr id="1267151" name="Notes Placeholder 2"/>
           <p:cNvSpPr>
             <a:spLocks noGrp="1"/>
           </p:cNvSpPr>
@@ -901,7 +893,7 @@
       </p:sp>
       <p:sp>
         <p:nvSpPr>
-          <p:cNvPr id="376364387" name="Slide Number Placeholder 3"/>
+          <p:cNvPr id="1912932990" name="Slide Number Placeholder 3"/>
           <p:cNvSpPr>
             <a:spLocks noGrp="1"/>
           </p:cNvSpPr>
@@ -952,7 +944,7 @@
       </p:grpSpPr>
       <p:sp>
         <p:nvSpPr>
-          <p:cNvPr id="1029932097" name="Slide Image Placeholder 1"/>
+          <p:cNvPr id="601616053" name="Slide Image Placeholder 1"/>
           <p:cNvSpPr>
             <a:spLocks noChangeAspect="1" noGrp="1" noRot="1"/>
           </p:cNvSpPr>
@@ -964,7 +956,7 @@
       </p:sp>
       <p:sp>
         <p:nvSpPr>
-          <p:cNvPr id="1326687677" name="Notes Placeholder 2"/>
+          <p:cNvPr id="882388545" name="Notes Placeholder 2"/>
           <p:cNvSpPr>
             <a:spLocks noGrp="1"/>
           </p:cNvSpPr>
@@ -986,7 +978,7 @@
       </p:sp>
       <p:sp>
         <p:nvSpPr>
-          <p:cNvPr id="1491621643" name="Slide Number Placeholder 3"/>
+          <p:cNvPr id="1246371748" name="Slide Number Placeholder 3"/>
           <p:cNvSpPr>
             <a:spLocks noGrp="1"/>
           </p:cNvSpPr>
@@ -1037,7 +1029,7 @@
       </p:grpSpPr>
       <p:sp>
         <p:nvSpPr>
-          <p:cNvPr id="1792707812" name="Slide Image Placeholder 1"/>
+          <p:cNvPr id="26877519" name="Slide Image Placeholder 1"/>
           <p:cNvSpPr>
             <a:spLocks noChangeAspect="1" noGrp="1" noRot="1"/>
           </p:cNvSpPr>
@@ -1049,7 +1041,7 @@
       </p:sp>
       <p:sp>
         <p:nvSpPr>
-          <p:cNvPr id="389839636" name="Notes Placeholder 2"/>
+          <p:cNvPr id="934056451" name="Notes Placeholder 2"/>
           <p:cNvSpPr>
             <a:spLocks noGrp="1"/>
           </p:cNvSpPr>
@@ -1071,7 +1063,7 @@
       </p:sp>
       <p:sp>
         <p:nvSpPr>
-          <p:cNvPr id="1716047091" name="Slide Number Placeholder 3"/>
+          <p:cNvPr id="453913409" name="Slide Number Placeholder 3"/>
           <p:cNvSpPr>
             <a:spLocks noGrp="1"/>
           </p:cNvSpPr>
@@ -1122,7 +1114,7 @@
       </p:grpSpPr>
       <p:sp>
         <p:nvSpPr>
-          <p:cNvPr id="1010397838" name="Slide Image Placeholder 1"/>
+          <p:cNvPr id="1685933649" name="Slide Image Placeholder 1"/>
           <p:cNvSpPr>
             <a:spLocks noChangeAspect="1" noGrp="1" noRot="1"/>
           </p:cNvSpPr>
@@ -1134,7 +1126,7 @@
       </p:sp>
       <p:sp>
         <p:nvSpPr>
-          <p:cNvPr id="1833251732" name="Notes Placeholder 2"/>
+          <p:cNvPr id="77116407" name="Notes Placeholder 2"/>
           <p:cNvSpPr>
             <a:spLocks noGrp="1"/>
           </p:cNvSpPr>
@@ -1156,7 +1148,7 @@
       </p:sp>
       <p:sp>
         <p:nvSpPr>
-          <p:cNvPr id="1743370278" name="Slide Number Placeholder 3"/>
+          <p:cNvPr id="1166942029" name="Slide Number Placeholder 3"/>
           <p:cNvSpPr>
             <a:spLocks noGrp="1"/>
           </p:cNvSpPr>
@@ -1207,7 +1199,7 @@
       </p:grpSpPr>
       <p:sp>
         <p:nvSpPr>
-          <p:cNvPr id="245949774" name="Slide Image Placeholder 1"/>
+          <p:cNvPr id="642823732" name="Slide Image Placeholder 1"/>
           <p:cNvSpPr>
             <a:spLocks noChangeAspect="1" noGrp="1" noRot="1"/>
           </p:cNvSpPr>
@@ -1219,7 +1211,7 @@
       </p:sp>
       <p:sp>
         <p:nvSpPr>
-          <p:cNvPr id="1608237437" name="Notes Placeholder 2"/>
+          <p:cNvPr id="690393160" name="Notes Placeholder 2"/>
           <p:cNvSpPr>
             <a:spLocks noGrp="1"/>
           </p:cNvSpPr>
@@ -1241,7 +1233,7 @@
       </p:sp>
       <p:sp>
         <p:nvSpPr>
-          <p:cNvPr id="220769162" name="Slide Number Placeholder 3"/>
+          <p:cNvPr id="1162031896" name="Slide Number Placeholder 3"/>
           <p:cNvSpPr>
             <a:spLocks noGrp="1"/>
           </p:cNvSpPr>
@@ -1292,7 +1284,7 @@
       </p:grpSpPr>
       <p:sp>
         <p:nvSpPr>
-          <p:cNvPr id="2" name="Slide Image Placeholder 1"/>
+          <p:cNvPr id="862351701" name="Slide Image Placeholder 1"/>
           <p:cNvSpPr>
             <a:spLocks noChangeAspect="1" noGrp="1" noRot="1"/>
           </p:cNvSpPr>
@@ -1304,7 +1296,7 @@
       </p:sp>
       <p:sp>
         <p:nvSpPr>
-          <p:cNvPr id="3" name="Notes Placeholder 2"/>
+          <p:cNvPr id="1154740744" name="Notes Placeholder 2"/>
           <p:cNvSpPr>
             <a:spLocks noGrp="1"/>
           </p:cNvSpPr>
@@ -1326,7 +1318,7 @@
       </p:sp>
       <p:sp>
         <p:nvSpPr>
-          <p:cNvPr id="4" name="Slide Number Placeholder 3"/>
+          <p:cNvPr id="779223610" name="Slide Number Placeholder 3"/>
           <p:cNvSpPr>
             <a:spLocks noGrp="1"/>
           </p:cNvSpPr>
@@ -1342,7 +1334,7 @@
             <a:pPr>
               <a:defRPr/>
             </a:pPr>
-            <a:fld id="{CA259A46-31E6-B907-3ADF-671DF83D2EA8}" type="slidenum">
+            <a:fld id="{6F9A288E-6814-F26C-839D-08BA84562618}" type="slidenum">
               <a:rPr/>
               <a:t/>
             </a:fld>
@@ -1377,7 +1369,7 @@
       </p:grpSpPr>
       <p:sp>
         <p:nvSpPr>
-          <p:cNvPr id="1314122030" name="Slide Image Placeholder 1"/>
+          <p:cNvPr id="1107529167" name="Slide Image Placeholder 1"/>
           <p:cNvSpPr>
             <a:spLocks noChangeAspect="1" noGrp="1" noRot="1"/>
           </p:cNvSpPr>
@@ -1389,7 +1381,7 @@
       </p:sp>
       <p:sp>
         <p:nvSpPr>
-          <p:cNvPr id="1104684512" name="Notes Placeholder 2"/>
+          <p:cNvPr id="1884799683" name="Notes Placeholder 2"/>
           <p:cNvSpPr>
             <a:spLocks noGrp="1"/>
           </p:cNvSpPr>
@@ -1411,7 +1403,7 @@
       </p:sp>
       <p:sp>
         <p:nvSpPr>
-          <p:cNvPr id="923467823" name="Slide Number Placeholder 3"/>
+          <p:cNvPr id="1461846482" name="Slide Number Placeholder 3"/>
           <p:cNvSpPr>
             <a:spLocks noGrp="1"/>
           </p:cNvSpPr>
@@ -1427,7 +1419,7 @@
             <a:pPr>
               <a:defRPr/>
             </a:pPr>
-            <a:fld id="{6F9A288E-6814-F26C-839D-08BA84562618}" type="slidenum">
+            <a:fld id="{35DE5430-809A-928A-A542-405C7FD25D2C}" type="slidenum">
               <a:rPr/>
               <a:t/>
             </a:fld>
@@ -1462,7 +1454,7 @@
       </p:grpSpPr>
       <p:sp>
         <p:nvSpPr>
-          <p:cNvPr id="1363507704" name="Slide Image Placeholder 1"/>
+          <p:cNvPr id="707224469" name="Slide Image Placeholder 1"/>
           <p:cNvSpPr>
             <a:spLocks noChangeAspect="1" noGrp="1" noRot="1"/>
           </p:cNvSpPr>
@@ -1474,7 +1466,7 @@
       </p:sp>
       <p:sp>
         <p:nvSpPr>
-          <p:cNvPr id="255377602" name="Notes Placeholder 2"/>
+          <p:cNvPr id="1114619675" name="Notes Placeholder 2"/>
           <p:cNvSpPr>
             <a:spLocks noGrp="1"/>
           </p:cNvSpPr>
@@ -1496,7 +1488,7 @@
       </p:sp>
       <p:sp>
         <p:nvSpPr>
-          <p:cNvPr id="32165666" name="Slide Number Placeholder 3"/>
+          <p:cNvPr id="1013098991" name="Slide Number Placeholder 3"/>
           <p:cNvSpPr>
             <a:spLocks noGrp="1"/>
           </p:cNvSpPr>
@@ -1512,7 +1504,7 @@
             <a:pPr>
               <a:defRPr/>
             </a:pPr>
-            <a:fld id="{35DE5430-809A-928A-A542-405C7FD25D2C}" type="slidenum">
+            <a:fld id="{7615F4FE-82B4-FE68-4C10-E68169046F04}" type="slidenum">
               <a:rPr/>
               <a:t/>
             </a:fld>
@@ -1547,7 +1539,7 @@
       </p:grpSpPr>
       <p:sp>
         <p:nvSpPr>
-          <p:cNvPr id="551904965" name="Slide Image Placeholder 1"/>
+          <p:cNvPr id="1370969103" name="Slide Image Placeholder 1"/>
           <p:cNvSpPr>
             <a:spLocks noChangeAspect="1" noGrp="1" noRot="1"/>
           </p:cNvSpPr>
@@ -1559,7 +1551,7 @@
       </p:sp>
       <p:sp>
         <p:nvSpPr>
-          <p:cNvPr id="1915050174" name="Notes Placeholder 2"/>
+          <p:cNvPr id="1769847322" name="Notes Placeholder 2"/>
           <p:cNvSpPr>
             <a:spLocks noGrp="1"/>
           </p:cNvSpPr>
@@ -1581,7 +1573,7 @@
       </p:sp>
       <p:sp>
         <p:nvSpPr>
-          <p:cNvPr id="700601554" name="Slide Number Placeholder 3"/>
+          <p:cNvPr id="1350505152" name="Slide Number Placeholder 3"/>
           <p:cNvSpPr>
             <a:spLocks noGrp="1"/>
           </p:cNvSpPr>
@@ -1597,7 +1589,7 @@
             <a:pPr>
               <a:defRPr/>
             </a:pPr>
-            <a:fld id="{7615F4FE-82B4-FE68-4C10-E68169046F04}" type="slidenum">
+            <a:fld id="{F4CCE025-10A5-3677-46D9-0FB97248EE3B}" type="slidenum">
               <a:rPr/>
               <a:t/>
             </a:fld>
@@ -1632,7 +1624,7 @@
       </p:grpSpPr>
       <p:sp>
         <p:nvSpPr>
-          <p:cNvPr id="1999960787" name="Slide Image Placeholder 1"/>
+          <p:cNvPr id="1069053323" name="Slide Image Placeholder 1"/>
           <p:cNvSpPr>
             <a:spLocks noChangeAspect="1" noGrp="1" noRot="1"/>
           </p:cNvSpPr>
@@ -1644,7 +1636,7 @@
       </p:sp>
       <p:sp>
         <p:nvSpPr>
-          <p:cNvPr id="1439383100" name="Notes Placeholder 2"/>
+          <p:cNvPr id="1977710422" name="Notes Placeholder 2"/>
           <p:cNvSpPr>
             <a:spLocks noGrp="1"/>
           </p:cNvSpPr>
@@ -1666,7 +1658,7 @@
       </p:sp>
       <p:sp>
         <p:nvSpPr>
-          <p:cNvPr id="796804150" name="Slide Number Placeholder 3"/>
+          <p:cNvPr id="308613243" name="Slide Number Placeholder 3"/>
           <p:cNvSpPr>
             <a:spLocks noGrp="1"/>
           </p:cNvSpPr>
@@ -1682,7 +1674,7 @@
             <a:pPr>
               <a:defRPr/>
             </a:pPr>
-            <a:fld id="{F4CCE025-10A5-3677-46D9-0FB97248EE3B}" type="slidenum">
+            <a:fld id="{1B01CEE4-8AF1-45C4-EEAE-2E1F44F82F73}" type="slidenum">
               <a:rPr/>
               <a:t/>
             </a:fld>
@@ -1717,7 +1709,7 @@
       </p:grpSpPr>
       <p:sp>
         <p:nvSpPr>
-          <p:cNvPr id="1972178798" name="Slide Image Placeholder 1"/>
+          <p:cNvPr id="1767523903" name="Slide Image Placeholder 1"/>
           <p:cNvSpPr>
             <a:spLocks noChangeAspect="1" noGrp="1" noRot="1"/>
           </p:cNvSpPr>
@@ -1729,7 +1721,7 @@
       </p:sp>
       <p:sp>
         <p:nvSpPr>
-          <p:cNvPr id="1393021322" name="Notes Placeholder 2"/>
+          <p:cNvPr id="452392406" name="Notes Placeholder 2"/>
           <p:cNvSpPr>
             <a:spLocks noGrp="1"/>
           </p:cNvSpPr>
@@ -1751,7 +1743,7 @@
       </p:sp>
       <p:sp>
         <p:nvSpPr>
-          <p:cNvPr id="446335386" name="Slide Number Placeholder 3"/>
+          <p:cNvPr id="1667971884" name="Slide Number Placeholder 3"/>
           <p:cNvSpPr>
             <a:spLocks noGrp="1"/>
           </p:cNvSpPr>
@@ -1767,7 +1759,7 @@
             <a:pPr>
               <a:defRPr/>
             </a:pPr>
-            <a:fld id="{1B01CEE4-8AF1-45C4-EEAE-2E1F44F82F73}" type="slidenum">
+            <a:fld id="{FF20D616-ACC0-672A-9F4E-48C3975B07A3}" type="slidenum">
               <a:rPr/>
               <a:t/>
             </a:fld>
@@ -1802,7 +1794,7 @@
       </p:grpSpPr>
       <p:sp>
         <p:nvSpPr>
-          <p:cNvPr id="154851154" name="Slide Image Placeholder 1"/>
+          <p:cNvPr id="490835429" name="Slide Image Placeholder 1"/>
           <p:cNvSpPr>
             <a:spLocks noChangeAspect="1" noGrp="1" noRot="1"/>
           </p:cNvSpPr>
@@ -1814,7 +1806,7 @@
       </p:sp>
       <p:sp>
         <p:nvSpPr>
-          <p:cNvPr id="841173305" name="Notes Placeholder 2"/>
+          <p:cNvPr id="31243696" name="Notes Placeholder 2"/>
           <p:cNvSpPr>
             <a:spLocks noGrp="1"/>
           </p:cNvSpPr>
@@ -1836,7 +1828,7 @@
       </p:sp>
       <p:sp>
         <p:nvSpPr>
-          <p:cNvPr id="1966915685" name="Slide Number Placeholder 3"/>
+          <p:cNvPr id="624393521" name="Slide Number Placeholder 3"/>
           <p:cNvSpPr>
             <a:spLocks noGrp="1"/>
           </p:cNvSpPr>
@@ -1852,7 +1844,7 @@
             <a:pPr>
               <a:defRPr/>
             </a:pPr>
-            <a:fld id="{FF20D616-ACC0-672A-9F4E-48C3975B07A3}" type="slidenum">
+            <a:fld id="{3FB30EA6-7778-8842-6180-EF5790EBA0BC}" type="slidenum">
               <a:rPr/>
               <a:t/>
             </a:fld>
@@ -1887,7 +1879,7 @@
       </p:grpSpPr>
       <p:sp>
         <p:nvSpPr>
-          <p:cNvPr id="943476202" name="Slide Image Placeholder 1"/>
+          <p:cNvPr id="789167881" name="Slide Image Placeholder 1"/>
           <p:cNvSpPr>
             <a:spLocks noChangeAspect="1" noGrp="1" noRot="1"/>
           </p:cNvSpPr>
@@ -1899,7 +1891,7 @@
       </p:sp>
       <p:sp>
         <p:nvSpPr>
-          <p:cNvPr id="1474002082" name="Notes Placeholder 2"/>
+          <p:cNvPr id="698840093" name="Notes Placeholder 2"/>
           <p:cNvSpPr>
             <a:spLocks noGrp="1"/>
           </p:cNvSpPr>
@@ -1921,7 +1913,7 @@
       </p:sp>
       <p:sp>
         <p:nvSpPr>
-          <p:cNvPr id="356929763" name="Slide Number Placeholder 3"/>
+          <p:cNvPr id="779140187" name="Slide Number Placeholder 3"/>
           <p:cNvSpPr>
             <a:spLocks noGrp="1"/>
           </p:cNvSpPr>
@@ -1937,7 +1929,7 @@
             <a:pPr>
               <a:defRPr/>
             </a:pPr>
-            <a:fld id="{3FB30EA6-7778-8842-6180-EF5790EBA0BC}" type="slidenum">
+            <a:fld id="{D98D482A-F057-494B-B24F-98EABBE8A51E}" type="slidenum">
               <a:rPr/>
               <a:t/>
             </a:fld>
@@ -1972,7 +1964,7 @@
       </p:grpSpPr>
       <p:sp>
         <p:nvSpPr>
-          <p:cNvPr id="533397108" name="Título 1"/>
+          <p:cNvPr id="705808209" name="Título 1"/>
           <p:cNvSpPr>
             <a:spLocks noGrp="1"/>
           </p:cNvSpPr>
@@ -2007,7 +1999,7 @@
       </p:sp>
       <p:sp>
         <p:nvSpPr>
-          <p:cNvPr id="1375462189" name="Subtítulo 2"/>
+          <p:cNvPr id="726981595" name="Subtítulo 2"/>
           <p:cNvSpPr>
             <a:spLocks noGrp="1"/>
           </p:cNvSpPr>
@@ -2075,7 +2067,7 @@
       </p:sp>
       <p:sp>
         <p:nvSpPr>
-          <p:cNvPr id="287653338" name="Marcador de fecha 3"/>
+          <p:cNvPr id="810830355" name="Marcador de fecha 3"/>
           <p:cNvSpPr>
             <a:spLocks noGrp="1"/>
           </p:cNvSpPr>
@@ -2101,7 +2093,7 @@
       </p:sp>
       <p:sp>
         <p:nvSpPr>
-          <p:cNvPr id="511443611" name="Marcador de pie de página 4"/>
+          <p:cNvPr id="1852144675" name="Marcador de pie de página 4"/>
           <p:cNvSpPr>
             <a:spLocks noGrp="1"/>
           </p:cNvSpPr>
@@ -2123,7 +2115,7 @@
       </p:sp>
       <p:sp>
         <p:nvSpPr>
-          <p:cNvPr id="1108483710" name="Marcador de número de diapositiva 5"/>
+          <p:cNvPr id="477914956" name="Marcador de número de diapositiva 5"/>
           <p:cNvSpPr>
             <a:spLocks noGrp="1"/>
           </p:cNvSpPr>
@@ -2174,7 +2166,7 @@
       </p:grpSpPr>
       <p:sp>
         <p:nvSpPr>
-          <p:cNvPr id="767809748" name="Título 1"/>
+          <p:cNvPr id="1188678160" name="Título 1"/>
           <p:cNvSpPr>
             <a:spLocks noGrp="1"/>
           </p:cNvSpPr>
@@ -2200,7 +2192,7 @@
       </p:sp>
       <p:sp>
         <p:nvSpPr>
-          <p:cNvPr id="685692380" name="Marcador de texto vertical 2"/>
+          <p:cNvPr id="1476343522" name="Marcador de texto vertical 2"/>
           <p:cNvSpPr>
             <a:spLocks noGrp="1"/>
           </p:cNvSpPr>
@@ -2266,7 +2258,7 @@
       </p:sp>
       <p:sp>
         <p:nvSpPr>
-          <p:cNvPr id="1837553629" name="Marcador de fecha 3"/>
+          <p:cNvPr id="1904414263" name="Marcador de fecha 3"/>
           <p:cNvSpPr>
             <a:spLocks noGrp="1"/>
           </p:cNvSpPr>
@@ -2292,7 +2284,7 @@
       </p:sp>
       <p:sp>
         <p:nvSpPr>
-          <p:cNvPr id="2096011734" name="Marcador de pie de página 4"/>
+          <p:cNvPr id="618400186" name="Marcador de pie de página 4"/>
           <p:cNvSpPr>
             <a:spLocks noGrp="1"/>
           </p:cNvSpPr>
@@ -2314,7 +2306,7 @@
       </p:sp>
       <p:sp>
         <p:nvSpPr>
-          <p:cNvPr id="510603286" name="Marcador de número de diapositiva 5"/>
+          <p:cNvPr id="1220901530" name="Marcador de número de diapositiva 5"/>
           <p:cNvSpPr>
             <a:spLocks noGrp="1"/>
           </p:cNvSpPr>
@@ -2365,7 +2357,7 @@
       </p:grpSpPr>
       <p:sp>
         <p:nvSpPr>
-          <p:cNvPr id="1845720383" name="Título vertical 1"/>
+          <p:cNvPr id="1501582543" name="Título vertical 1"/>
           <p:cNvSpPr>
             <a:spLocks noGrp="1"/>
           </p:cNvSpPr>
@@ -2396,7 +2388,7 @@
       </p:sp>
       <p:sp>
         <p:nvSpPr>
-          <p:cNvPr id="800370761" name="Marcador de texto vertical 2"/>
+          <p:cNvPr id="454973836" name="Marcador de texto vertical 2"/>
           <p:cNvSpPr>
             <a:spLocks noGrp="1"/>
           </p:cNvSpPr>
@@ -2467,7 +2459,7 @@
       </p:sp>
       <p:sp>
         <p:nvSpPr>
-          <p:cNvPr id="924496806" name="Marcador de fecha 3"/>
+          <p:cNvPr id="404158781" name="Marcador de fecha 3"/>
           <p:cNvSpPr>
             <a:spLocks noGrp="1"/>
           </p:cNvSpPr>
@@ -2493,7 +2485,7 @@
       </p:sp>
       <p:sp>
         <p:nvSpPr>
-          <p:cNvPr id="1111130627" name="Marcador de pie de página 4"/>
+          <p:cNvPr id="1626858324" name="Marcador de pie de página 4"/>
           <p:cNvSpPr>
             <a:spLocks noGrp="1"/>
           </p:cNvSpPr>
@@ -2515,7 +2507,7 @@
       </p:sp>
       <p:sp>
         <p:nvSpPr>
-          <p:cNvPr id="976078535" name="Marcador de número de diapositiva 5"/>
+          <p:cNvPr id="1646455587" name="Marcador de número de diapositiva 5"/>
           <p:cNvSpPr>
             <a:spLocks noGrp="1"/>
           </p:cNvSpPr>
@@ -2566,7 +2558,7 @@
       </p:grpSpPr>
       <p:sp>
         <p:nvSpPr>
-          <p:cNvPr id="895953928" name="Title 1"/>
+          <p:cNvPr id="294093349" name="Title 1"/>
           <p:cNvSpPr>
             <a:spLocks noGrp="1"/>
           </p:cNvSpPr>
@@ -2592,7 +2584,7 @@
       </p:sp>
       <p:sp>
         <p:nvSpPr>
-          <p:cNvPr id="2058344485" name="Marcador de contenido 2"/>
+          <p:cNvPr id="1426870344" name="Marcador de contenido 2"/>
           <p:cNvSpPr>
             <a:spLocks noGrp="1"/>
           </p:cNvSpPr>
@@ -2658,7 +2650,7 @@
       </p:sp>
       <p:sp>
         <p:nvSpPr>
-          <p:cNvPr id="1078370642" name="Marcador de fecha 3"/>
+          <p:cNvPr id="307180251" name="Marcador de fecha 3"/>
           <p:cNvSpPr>
             <a:spLocks noGrp="1"/>
           </p:cNvSpPr>
@@ -2684,7 +2676,7 @@
       </p:sp>
       <p:sp>
         <p:nvSpPr>
-          <p:cNvPr id="1604828008" name="Marcador de pie de página 4"/>
+          <p:cNvPr id="332744138" name="Marcador de pie de página 4"/>
           <p:cNvSpPr>
             <a:spLocks noGrp="1"/>
           </p:cNvSpPr>
@@ -2706,7 +2698,7 @@
       </p:sp>
       <p:sp>
         <p:nvSpPr>
-          <p:cNvPr id="1724383094" name="Marcador de número de diapositiva 5"/>
+          <p:cNvPr id="980948241" name="Marcador de número de diapositiva 5"/>
           <p:cNvSpPr>
             <a:spLocks noGrp="1"/>
           </p:cNvSpPr>
@@ -2757,7 +2749,7 @@
       </p:grpSpPr>
       <p:sp>
         <p:nvSpPr>
-          <p:cNvPr id="1511519202" name="Título 1"/>
+          <p:cNvPr id="20789771" name="Título 1"/>
           <p:cNvSpPr>
             <a:spLocks noGrp="1"/>
           </p:cNvSpPr>
@@ -2792,7 +2784,7 @@
       </p:sp>
       <p:sp>
         <p:nvSpPr>
-          <p:cNvPr id="690216753" name="Marcador de texto 2"/>
+          <p:cNvPr id="347413426" name="Marcador de texto 2"/>
           <p:cNvSpPr>
             <a:spLocks noGrp="1"/>
           </p:cNvSpPr>
@@ -2914,7 +2906,7 @@
       </p:sp>
       <p:sp>
         <p:nvSpPr>
-          <p:cNvPr id="302382302" name="Marcador de fecha 3"/>
+          <p:cNvPr id="341319286" name="Marcador de fecha 3"/>
           <p:cNvSpPr>
             <a:spLocks noGrp="1"/>
           </p:cNvSpPr>
@@ -2940,7 +2932,7 @@
       </p:sp>
       <p:sp>
         <p:nvSpPr>
-          <p:cNvPr id="1594226478" name="Marcador de pie de página 4"/>
+          <p:cNvPr id="1956326566" name="Marcador de pie de página 4"/>
           <p:cNvSpPr>
             <a:spLocks noGrp="1"/>
           </p:cNvSpPr>
@@ -2962,7 +2954,7 @@
       </p:sp>
       <p:sp>
         <p:nvSpPr>
-          <p:cNvPr id="579300921" name="Marcador de número de diapositiva 5"/>
+          <p:cNvPr id="1029008287" name="Marcador de número de diapositiva 5"/>
           <p:cNvSpPr>
             <a:spLocks noGrp="1"/>
           </p:cNvSpPr>
@@ -3013,7 +3005,7 @@
       </p:grpSpPr>
       <p:sp>
         <p:nvSpPr>
-          <p:cNvPr id="1680338389" name="Título 1"/>
+          <p:cNvPr id="718284760" name="Título 1"/>
           <p:cNvSpPr>
             <a:spLocks noGrp="1"/>
           </p:cNvSpPr>
@@ -3039,7 +3031,7 @@
       </p:sp>
       <p:sp>
         <p:nvSpPr>
-          <p:cNvPr id="1961709050" name="Marcador de contenido 2"/>
+          <p:cNvPr id="1987726728" name="Marcador de contenido 2"/>
           <p:cNvSpPr>
             <a:spLocks noGrp="1"/>
           </p:cNvSpPr>
@@ -3110,7 +3102,7 @@
       </p:sp>
       <p:sp>
         <p:nvSpPr>
-          <p:cNvPr id="944308591" name="Marcador de contenido 3"/>
+          <p:cNvPr id="185497876" name="Marcador de contenido 3"/>
           <p:cNvSpPr>
             <a:spLocks noGrp="1"/>
           </p:cNvSpPr>
@@ -3181,7 +3173,7 @@
       </p:sp>
       <p:sp>
         <p:nvSpPr>
-          <p:cNvPr id="1501354675" name="Marcador de fecha 4"/>
+          <p:cNvPr id="2025975864" name="Marcador de fecha 4"/>
           <p:cNvSpPr>
             <a:spLocks noGrp="1"/>
           </p:cNvSpPr>
@@ -3207,7 +3199,7 @@
       </p:sp>
       <p:sp>
         <p:nvSpPr>
-          <p:cNvPr id="1293832853" name="Marcador de pie de página 5"/>
+          <p:cNvPr id="2080932127" name="Marcador de pie de página 5"/>
           <p:cNvSpPr>
             <a:spLocks noGrp="1"/>
           </p:cNvSpPr>
@@ -3229,7 +3221,7 @@
       </p:sp>
       <p:sp>
         <p:nvSpPr>
-          <p:cNvPr id="736875587" name="Marcador de número de diapositiva 6"/>
+          <p:cNvPr id="769199670" name="Marcador de número de diapositiva 6"/>
           <p:cNvSpPr>
             <a:spLocks noGrp="1"/>
           </p:cNvSpPr>
@@ -3280,7 +3272,7 @@
       </p:grpSpPr>
       <p:sp>
         <p:nvSpPr>
-          <p:cNvPr id="1017062129" name="Título 1"/>
+          <p:cNvPr id="1061533360" name="Título 1"/>
           <p:cNvSpPr>
             <a:spLocks noGrp="1"/>
           </p:cNvSpPr>
@@ -3311,7 +3303,7 @@
       </p:sp>
       <p:sp>
         <p:nvSpPr>
-          <p:cNvPr id="1562036102" name="Marcador de texto 2"/>
+          <p:cNvPr id="585105644" name="Marcador de texto 2"/>
           <p:cNvSpPr>
             <a:spLocks noGrp="1"/>
           </p:cNvSpPr>
@@ -3379,7 +3371,7 @@
       </p:sp>
       <p:sp>
         <p:nvSpPr>
-          <p:cNvPr id="1127809438" name="Marcador de contenido 3"/>
+          <p:cNvPr id="1937869142" name="Marcador de contenido 3"/>
           <p:cNvSpPr>
             <a:spLocks noGrp="1"/>
           </p:cNvSpPr>
@@ -3450,7 +3442,7 @@
       </p:sp>
       <p:sp>
         <p:nvSpPr>
-          <p:cNvPr id="834936386" name="Marcador de texto 4"/>
+          <p:cNvPr id="64351878" name="Marcador de texto 4"/>
           <p:cNvSpPr>
             <a:spLocks noGrp="1"/>
           </p:cNvSpPr>
@@ -3518,7 +3510,7 @@
       </p:sp>
       <p:sp>
         <p:nvSpPr>
-          <p:cNvPr id="1000597851" name="Marcador de contenido 5"/>
+          <p:cNvPr id="1526425342" name="Marcador de contenido 5"/>
           <p:cNvSpPr>
             <a:spLocks noGrp="1"/>
           </p:cNvSpPr>
@@ -3589,7 +3581,7 @@
       </p:sp>
       <p:sp>
         <p:nvSpPr>
-          <p:cNvPr id="2129872142" name="Marcador de fecha 6"/>
+          <p:cNvPr id="1066483097" name="Marcador de fecha 6"/>
           <p:cNvSpPr>
             <a:spLocks noGrp="1"/>
           </p:cNvSpPr>
@@ -3615,7 +3607,7 @@
       </p:sp>
       <p:sp>
         <p:nvSpPr>
-          <p:cNvPr id="493833549" name="Marcador de pie de página 7"/>
+          <p:cNvPr id="1478187203" name="Marcador de pie de página 7"/>
           <p:cNvSpPr>
             <a:spLocks noGrp="1"/>
           </p:cNvSpPr>
@@ -3637,7 +3629,7 @@
       </p:sp>
       <p:sp>
         <p:nvSpPr>
-          <p:cNvPr id="86486397" name="Marcador de número de diapositiva 8"/>
+          <p:cNvPr id="1280037059" name="Marcador de número de diapositiva 8"/>
           <p:cNvSpPr>
             <a:spLocks noGrp="1"/>
           </p:cNvSpPr>
@@ -3688,7 +3680,7 @@
       </p:grpSpPr>
       <p:sp>
         <p:nvSpPr>
-          <p:cNvPr id="177425553" name="Título 1"/>
+          <p:cNvPr id="94378198" name="Título 1"/>
           <p:cNvSpPr>
             <a:spLocks noGrp="1"/>
           </p:cNvSpPr>
@@ -3714,7 +3706,7 @@
       </p:sp>
       <p:sp>
         <p:nvSpPr>
-          <p:cNvPr id="1744825201" name="Marcador de fecha 2"/>
+          <p:cNvPr id="2088694320" name="Marcador de fecha 2"/>
           <p:cNvSpPr>
             <a:spLocks noGrp="1"/>
           </p:cNvSpPr>
@@ -3740,7 +3732,7 @@
       </p:sp>
       <p:sp>
         <p:nvSpPr>
-          <p:cNvPr id="194706025" name="Marcador de pie de página 3"/>
+          <p:cNvPr id="1076412824" name="Marcador de pie de página 3"/>
           <p:cNvSpPr>
             <a:spLocks noGrp="1"/>
           </p:cNvSpPr>
@@ -3762,7 +3754,7 @@
       </p:sp>
       <p:sp>
         <p:nvSpPr>
-          <p:cNvPr id="127674063" name="Marcador de número de diapositiva 4"/>
+          <p:cNvPr id="216794527" name="Marcador de número de diapositiva 4"/>
           <p:cNvSpPr>
             <a:spLocks noGrp="1"/>
           </p:cNvSpPr>
@@ -3813,7 +3805,7 @@
       </p:grpSpPr>
       <p:sp>
         <p:nvSpPr>
-          <p:cNvPr id="84558975" name="Marcador de fecha 1"/>
+          <p:cNvPr id="613759215" name="Marcador de fecha 1"/>
           <p:cNvSpPr>
             <a:spLocks noGrp="1"/>
           </p:cNvSpPr>
@@ -3839,7 +3831,7 @@
       </p:sp>
       <p:sp>
         <p:nvSpPr>
-          <p:cNvPr id="463654982" name="Marcador de pie de página 2"/>
+          <p:cNvPr id="2010889770" name="Marcador de pie de página 2"/>
           <p:cNvSpPr>
             <a:spLocks noGrp="1"/>
           </p:cNvSpPr>
@@ -3861,7 +3853,7 @@
       </p:sp>
       <p:sp>
         <p:nvSpPr>
-          <p:cNvPr id="1294671436" name="Marcador de número de diapositiva 3"/>
+          <p:cNvPr id="1957444128" name="Marcador de número de diapositiva 3"/>
           <p:cNvSpPr>
             <a:spLocks noGrp="1"/>
           </p:cNvSpPr>
@@ -3912,7 +3904,7 @@
       </p:grpSpPr>
       <p:sp>
         <p:nvSpPr>
-          <p:cNvPr id="1760303498" name="Título 1"/>
+          <p:cNvPr id="929224534" name="Título 1"/>
           <p:cNvSpPr>
             <a:spLocks noGrp="1"/>
           </p:cNvSpPr>
@@ -3947,7 +3939,7 @@
       </p:sp>
       <p:sp>
         <p:nvSpPr>
-          <p:cNvPr id="1796651431" name="Marcador de contenido 2"/>
+          <p:cNvPr id="39423740" name="Marcador de contenido 2"/>
           <p:cNvSpPr>
             <a:spLocks noGrp="1"/>
           </p:cNvSpPr>
@@ -4046,7 +4038,7 @@
       </p:sp>
       <p:sp>
         <p:nvSpPr>
-          <p:cNvPr id="842302599" name="Marcador de texto 3"/>
+          <p:cNvPr id="287419967" name="Marcador de texto 3"/>
           <p:cNvSpPr>
             <a:spLocks noGrp="1"/>
           </p:cNvSpPr>
@@ -4114,7 +4106,7 @@
       </p:sp>
       <p:sp>
         <p:nvSpPr>
-          <p:cNvPr id="735824625" name="Marcador de fecha 4"/>
+          <p:cNvPr id="1202103030" name="Marcador de fecha 4"/>
           <p:cNvSpPr>
             <a:spLocks noGrp="1"/>
           </p:cNvSpPr>
@@ -4140,7 +4132,7 @@
       </p:sp>
       <p:sp>
         <p:nvSpPr>
-          <p:cNvPr id="925864865" name="Marcador de pie de página 5"/>
+          <p:cNvPr id="787736220" name="Marcador de pie de página 5"/>
           <p:cNvSpPr>
             <a:spLocks noGrp="1"/>
           </p:cNvSpPr>
@@ -4162,7 +4154,7 @@
       </p:sp>
       <p:sp>
         <p:nvSpPr>
-          <p:cNvPr id="2141901207" name="Marcador de número de diapositiva 6"/>
+          <p:cNvPr id="1455756988" name="Marcador de número de diapositiva 6"/>
           <p:cNvSpPr>
             <a:spLocks noGrp="1"/>
           </p:cNvSpPr>
@@ -4213,7 +4205,7 @@
       </p:grpSpPr>
       <p:sp>
         <p:nvSpPr>
-          <p:cNvPr id="506255975" name="Título 1"/>
+          <p:cNvPr id="992542264" name="Título 1"/>
           <p:cNvSpPr>
             <a:spLocks noGrp="1"/>
           </p:cNvSpPr>
@@ -4248,7 +4240,7 @@
       </p:sp>
       <p:sp>
         <p:nvSpPr>
-          <p:cNvPr id="767619265" name="Marcador de posición de imagen 2"/>
+          <p:cNvPr id="67090871" name="Marcador de posición de imagen 2"/>
           <p:cNvSpPr>
             <a:spLocks noChangeAspect="1" noGrp="1"/>
           </p:cNvSpPr>
@@ -4316,7 +4308,7 @@
       </p:sp>
       <p:sp>
         <p:nvSpPr>
-          <p:cNvPr id="1750137794" name="Marcador de texto 3"/>
+          <p:cNvPr id="698338586" name="Marcador de texto 3"/>
           <p:cNvSpPr>
             <a:spLocks noGrp="1"/>
           </p:cNvSpPr>
@@ -4384,7 +4376,7 @@
       </p:sp>
       <p:sp>
         <p:nvSpPr>
-          <p:cNvPr id="1032587227" name="Marcador de fecha 4"/>
+          <p:cNvPr id="319306702" name="Marcador de fecha 4"/>
           <p:cNvSpPr>
             <a:spLocks noGrp="1"/>
           </p:cNvSpPr>
@@ -4410,7 +4402,7 @@
       </p:sp>
       <p:sp>
         <p:nvSpPr>
-          <p:cNvPr id="1731378364" name="Marcador de pie de página 5"/>
+          <p:cNvPr id="1693381230" name="Marcador de pie de página 5"/>
           <p:cNvSpPr>
             <a:spLocks noGrp="1"/>
           </p:cNvSpPr>
@@ -4432,7 +4424,7 @@
       </p:sp>
       <p:sp>
         <p:nvSpPr>
-          <p:cNvPr id="267857723" name="Marcador de número de diapositiva 6"/>
+          <p:cNvPr id="1158033748" name="Marcador de número de diapositiva 6"/>
           <p:cNvSpPr>
             <a:spLocks noGrp="1"/>
           </p:cNvSpPr>
@@ -4488,7 +4480,7 @@
       </p:grpSpPr>
       <p:sp>
         <p:nvSpPr>
-          <p:cNvPr id="136443717" name="Marcador de título 1"/>
+          <p:cNvPr id="839685529" name="Marcador de título 1"/>
           <p:cNvSpPr>
             <a:spLocks noGrp="1"/>
           </p:cNvSpPr>
@@ -4524,7 +4516,7 @@
       </p:sp>
       <p:sp>
         <p:nvSpPr>
-          <p:cNvPr id="1140612523" name="Marcador de texto 2"/>
+          <p:cNvPr id="1868694277" name="Marcador de texto 2"/>
           <p:cNvSpPr>
             <a:spLocks noGrp="1"/>
           </p:cNvSpPr>
@@ -4600,7 +4592,7 @@
       </p:sp>
       <p:sp>
         <p:nvSpPr>
-          <p:cNvPr id="1416311040" name="Marcador de fecha 3"/>
+          <p:cNvPr id="23125421" name="Marcador de fecha 3"/>
           <p:cNvSpPr>
             <a:spLocks noGrp="1"/>
           </p:cNvSpPr>
@@ -4644,7 +4636,7 @@
       </p:sp>
       <p:sp>
         <p:nvSpPr>
-          <p:cNvPr id="813720073" name="Marcador de pie de página 4"/>
+          <p:cNvPr id="1581187955" name="Marcador de pie de página 4"/>
           <p:cNvSpPr>
             <a:spLocks noGrp="1"/>
           </p:cNvSpPr>
@@ -4684,7 +4676,7 @@
       </p:sp>
       <p:sp>
         <p:nvSpPr>
-          <p:cNvPr id="293145654" name="Marcador de número de diapositiva 5"/>
+          <p:cNvPr id="1314287513" name="Marcador de número de diapositiva 5"/>
           <p:cNvSpPr>
             <a:spLocks noGrp="1"/>
           </p:cNvSpPr>
@@ -5044,45 +5036,148 @@
       </p:grpSpPr>
       <p:sp>
         <p:nvSpPr>
-          <p:cNvPr id="151400245" name="Título 1"/>
-          <p:cNvSpPr>
-            <a:spLocks noGrp="1"/>
-          </p:cNvSpPr>
-          <p:nvPr>
-            <p:ph type="ctrTitle"/>
-          </p:nvPr>
-        </p:nvSpPr>
-        <p:spPr bwMode="auto"/>
-        <p:txBody>
-          <a:bodyPr/>
-          <a:lstStyle/>
-          <a:p>
-            <a:pPr>
-              <a:defRPr/>
-            </a:pPr>
-            <a:endParaRPr lang="es-ES"/>
-          </a:p>
-        </p:txBody>
-      </p:sp>
-      <p:sp>
-        <p:nvSpPr>
-          <p:cNvPr id="1308137960" name="Subtítulo 2"/>
-          <p:cNvSpPr>
-            <a:spLocks noGrp="1"/>
-          </p:cNvSpPr>
-          <p:nvPr>
-            <p:ph type="subTitle" idx="1"/>
-          </p:nvPr>
-        </p:nvSpPr>
-        <p:spPr bwMode="auto"/>
-        <p:txBody>
-          <a:bodyPr/>
-          <a:lstStyle/>
-          <a:p>
-            <a:pPr>
-              <a:defRPr/>
-            </a:pPr>
-            <a:endParaRPr lang="es-ES"/>
+          <p:cNvPr id="113378524" name="Title 1"/>
+          <p:cNvSpPr>
+            <a:spLocks noGrp="1"/>
+          </p:cNvSpPr>
+          <p:nvPr>
+            <p:ph type="title"/>
+          </p:nvPr>
+        </p:nvSpPr>
+        <p:spPr bwMode="auto">
+          <a:xfrm flipH="0" flipV="0">
+            <a:off x="4998798" y="365124"/>
+            <a:ext cx="6355001" cy="1325562"/>
+          </a:xfrm>
+        </p:spPr>
+        <p:txBody>
+          <a:bodyPr/>
+          <a:lstStyle/>
+          <a:p>
+            <a:pPr>
+              <a:defRPr/>
+            </a:pPr>
+            <a:r>
+              <a:rPr lang="es-MX" sz="2400">
+                <a:latin typeface="Arial"/>
+                <a:ea typeface="Arial"/>
+                <a:cs typeface="Arial"/>
+              </a:rPr>
+              <a:t>Corrección 001</a:t>
+            </a:r>
+            <a:endParaRPr sz="2400">
+              <a:latin typeface="Arial"/>
+              <a:cs typeface="Arial"/>
+            </a:endParaRPr>
+          </a:p>
+        </p:txBody>
+      </p:sp>
+      <p:sp>
+        <p:nvSpPr>
+          <p:cNvPr id="944954871" name="Marcador de contenido 2"/>
+          <p:cNvSpPr>
+            <a:spLocks noGrp="1"/>
+          </p:cNvSpPr>
+          <p:nvPr>
+            <p:ph idx="1"/>
+          </p:nvPr>
+        </p:nvSpPr>
+        <p:spPr bwMode="auto">
+          <a:xfrm flipH="0" flipV="0">
+            <a:off x="4998798" y="1825624"/>
+            <a:ext cx="6355001" cy="4351338"/>
+          </a:xfrm>
+        </p:spPr>
+        <p:txBody>
+          <a:bodyPr/>
+          <a:lstStyle/>
+          <a:p>
+            <a:pPr marL="0" indent="0">
+              <a:buFont typeface="Arial"/>
+              <a:buNone/>
+              <a:defRPr/>
+            </a:pPr>
+            <a:r>
+              <a:rPr lang="es-ES" sz="2400" b="0" i="0" u="none" strike="noStrike" cap="none" spc="0">
+                <a:solidFill>
+                  <a:schemeClr val="tx1"/>
+                </a:solidFill>
+                <a:latin typeface="Arial"/>
+                <a:ea typeface="Arial"/>
+                <a:cs typeface="Arial"/>
+              </a:rPr>
+              <a:t>Se realizó una corrección en el ejemplo correspondiente a la definición de “babear”, ajustando el orden de la información para asegurar claridad y coherencia.</a:t>
+            </a:r>
+            <a:endParaRPr sz="2400">
+              <a:latin typeface="Arial"/>
+              <a:cs typeface="Arial"/>
+            </a:endParaRPr>
+          </a:p>
+        </p:txBody>
+      </p:sp>
+      <p:pic>
+        <p:nvPicPr>
+          <p:cNvPr id="653561978" name=""/>
+          <p:cNvPicPr>
+            <a:picLocks noChangeAspect="1"/>
+          </p:cNvPicPr>
+          <p:nvPr/>
+        </p:nvPicPr>
+        <p:blipFill rotWithShape="1">
+          <a:blip r:embed="rId3"/>
+          <a:stretch/>
+        </p:blipFill>
+        <p:spPr bwMode="auto">
+          <a:xfrm>
+            <a:off x="259772" y="0"/>
+            <a:ext cx="3962399" cy="8553449"/>
+          </a:xfrm>
+          <a:prstGeom prst="rect">
+            <a:avLst/>
+          </a:prstGeom>
+        </p:spPr>
+      </p:pic>
+      <p:sp>
+        <p:nvSpPr>
+          <p:cNvPr id="324868582" name=""/>
+          <p:cNvSpPr/>
+          <p:nvPr/>
+        </p:nvSpPr>
+        <p:spPr bwMode="auto">
+          <a:xfrm rot="0" flipH="0" flipV="0">
+            <a:off x="-11103" y="1719447"/>
+            <a:ext cx="270876" cy="2746168"/>
+          </a:xfrm>
+          <a:prstGeom prst="rect">
+            <a:avLst/>
+          </a:prstGeom>
+        </p:spPr>
+        <p:style>
+          <a:lnRef idx="2">
+            <a:schemeClr val="accent1">
+              <a:shade val="50000"/>
+            </a:schemeClr>
+          </a:lnRef>
+          <a:fillRef idx="1">
+            <a:schemeClr val="accent1"/>
+          </a:fillRef>
+          <a:effectRef idx="0">
+            <a:schemeClr val="accent1"/>
+          </a:effectRef>
+          <a:fontRef idx="minor">
+            <a:schemeClr val="lt1"/>
+          </a:fontRef>
+        </p:style>
+        <p:txBody>
+          <a:bodyPr anchor="ctr"/>
+          <a:p>
+            <a:pPr algn="ctr">
+              <a:defRPr/>
+            </a:pPr>
+            <a:endParaRPr sz="2400">
+              <a:latin typeface="Arial"/>
+              <a:cs typeface="Arial"/>
+            </a:endParaRPr>
           </a:p>
         </p:txBody>
       </p:sp>
@@ -5121,7 +5216,7 @@
       </p:grpSpPr>
       <p:sp>
         <p:nvSpPr>
-          <p:cNvPr id="551514959" name="Title 1"/>
+          <p:cNvPr id="1653947909" name="Title 1"/>
           <p:cNvSpPr>
             <a:spLocks noGrp="1"/>
           </p:cNvSpPr>
@@ -5131,28 +5226,28 @@
         </p:nvSpPr>
         <p:spPr bwMode="auto">
           <a:xfrm flipH="0" flipV="0">
-            <a:off x="4998798" y="365124"/>
-            <a:ext cx="6355001" cy="1325562"/>
-          </a:xfrm>
-        </p:spPr>
-        <p:txBody>
-          <a:bodyPr/>
-          <a:lstStyle/>
-          <a:p>
-            <a:pPr>
-              <a:defRPr/>
-            </a:pPr>
-            <a:r>
-              <a:rPr lang="es-MX"/>
-              <a:t>Corrección 002</a:t>
-            </a:r>
-            <a:endParaRPr/>
-          </a:p>
-        </p:txBody>
-      </p:sp>
-      <p:sp>
-        <p:nvSpPr>
-          <p:cNvPr id="1142923941" name="Marcador de contenido 2"/>
+            <a:off x="4998798" y="365123"/>
+            <a:ext cx="6355000" cy="1325561"/>
+          </a:xfrm>
+        </p:spPr>
+        <p:txBody>
+          <a:bodyPr/>
+          <a:lstStyle/>
+          <a:p>
+            <a:pPr>
+              <a:defRPr/>
+            </a:pPr>
+            <a:r>
+              <a:rPr lang="es-MX" sz="2400"/>
+              <a:t>Corrección 010</a:t>
+            </a:r>
+            <a:endParaRPr sz="2400"/>
+          </a:p>
+        </p:txBody>
+      </p:sp>
+      <p:sp>
+        <p:nvSpPr>
+          <p:cNvPr id="1515357618" name="Marcador de contenido 2"/>
           <p:cNvSpPr>
             <a:spLocks noGrp="1"/>
           </p:cNvSpPr>
@@ -5162,8 +5257,8 @@
         </p:nvSpPr>
         <p:spPr bwMode="auto">
           <a:xfrm flipH="0" flipV="0">
-            <a:off x="4998798" y="1825624"/>
-            <a:ext cx="6355001" cy="4351338"/>
+            <a:off x="4998798" y="1825623"/>
+            <a:ext cx="6355000" cy="4351338"/>
           </a:xfrm>
         </p:spPr>
         <p:txBody>
@@ -5178,7 +5273,7 @@
               <a:defRPr/>
             </a:pPr>
             <a:r>
-              <a:rPr lang="es-ES" sz="2700" b="0" i="0" u="none" strike="noStrike" cap="none" spc="0">
+              <a:rPr lang="es-ES" sz="2400" b="0" i="0" u="none" strike="noStrike" cap="none" spc="0">
                 <a:solidFill>
                   <a:schemeClr val="tx1"/>
                 </a:solidFill>
@@ -5186,9 +5281,9 @@
                 <a:ea typeface="Arial"/>
                 <a:cs typeface="Arial"/>
               </a:rPr>
-              <a:t>rayado</a:t>
-            </a:r>
-            <a:endParaRPr lang="es-ES" sz="2700" b="0" i="0" u="none" strike="noStrike" cap="none" spc="0">
+              <a:t>checo </a:t>
+            </a:r>
+            <a:endParaRPr sz="2400" b="0" i="0" u="none" strike="noStrike" cap="none" spc="0">
               <a:solidFill>
                 <a:schemeClr val="tx1"/>
               </a:solidFill>
@@ -5203,7 +5298,7 @@
               <a:defRPr/>
             </a:pPr>
             <a:r>
-              <a:rPr lang="es-ES" sz="2700" b="0" i="0" u="none" strike="noStrike" cap="none" spc="0">
+              <a:rPr lang="es-ES" sz="2400" b="0" i="0" u="none" strike="noStrike" cap="none" spc="0">
                 <a:solidFill>
                   <a:schemeClr val="tx1"/>
                 </a:solidFill>
@@ -5211,72 +5306,22 @@
                 <a:ea typeface="Arial"/>
                 <a:cs typeface="Arial"/>
               </a:rPr>
-              <a:t>2. pop. Persona que llama la atención por tener una forma extraña y extravagante de actuar o de vestir: </a:t>
-            </a:r>
-            <a:endParaRPr lang="es-ES" sz="2700" b="0" i="0" u="none" strike="noStrike" cap="none" spc="0">
-              <a:solidFill>
-                <a:schemeClr val="tx1"/>
-              </a:solidFill>
-              <a:latin typeface="Arial"/>
-              <a:cs typeface="Arial"/>
-            </a:endParaRPr>
-          </a:p>
-          <a:p>
-            <a:pPr marL="0" indent="0">
-              <a:buFont typeface="Arial"/>
-              <a:buNone/>
-              <a:defRPr/>
-            </a:pPr>
-            <a:r>
-              <a:rPr lang="es-ES" sz="2700" b="0" i="0" u="none" strike="noStrike" cap="none" spc="0">
-                <a:solidFill>
-                  <a:schemeClr val="tx1"/>
-                </a:solidFill>
-                <a:latin typeface="Arial"/>
-                <a:ea typeface="Arial"/>
-                <a:cs typeface="Arial"/>
-              </a:rPr>
-              <a:t>—Melena, pantalones raídos, chompa de cuero vieja, el Fuete Monsalve nunca dejó de parecer y ser un rayado.[Ad hoc.]</a:t>
-            </a:r>
-            <a:endParaRPr lang="es-ES" sz="2700" b="0" i="0" u="none" strike="noStrike" cap="none" spc="0">
-              <a:solidFill>
-                <a:schemeClr val="tx1"/>
-              </a:solidFill>
-              <a:latin typeface="Arial"/>
-              <a:cs typeface="Arial"/>
-            </a:endParaRPr>
-          </a:p>
-          <a:p>
-            <a:pPr marL="0" indent="0">
-              <a:buFont typeface="Arial"/>
-              <a:buNone/>
-              <a:defRPr/>
-            </a:pPr>
-            <a:r>
-              <a:rPr lang="es-ES" sz="2700" b="0" i="0" u="none" strike="noStrike" cap="none" spc="0">
-                <a:solidFill>
-                  <a:schemeClr val="tx1"/>
-                </a:solidFill>
-                <a:latin typeface="Arial"/>
-                <a:ea typeface="Arial"/>
-                <a:cs typeface="Arial"/>
-              </a:rPr>
-              <a:t>(Borrar la definición del ejemplo)</a:t>
-            </a:r>
-            <a:endParaRPr/>
-          </a:p>
-        </p:txBody>
-      </p:sp>
-      <p:sp>
-        <p:nvSpPr>
-          <p:cNvPr id="9163182" name=""/>
+              <a:t>La categoría de tóxicos, se registró el uso de 4 especies, la principal Sapindus saponaria L. (Checo), cabe recalcar que su uso ya no se practica en la actualidad. [Tesis], Cinthia Córdova, Valoración económica de productos forestales no maderables de origen vegetal del bosque seco del cantón Pindal. </a:t>
+            </a:r>
+            <a:endParaRPr sz="2400"/>
+          </a:p>
+        </p:txBody>
+      </p:sp>
+      <p:sp>
+        <p:nvSpPr>
+          <p:cNvPr id="375077937" name=""/>
           <p:cNvSpPr/>
           <p:nvPr/>
         </p:nvSpPr>
         <p:spPr bwMode="auto">
           <a:xfrm rot="0" flipH="0" flipV="0">
-            <a:off x="-11102" y="1719447"/>
-            <a:ext cx="270875" cy="2746167"/>
+            <a:off x="-11101" y="1719446"/>
+            <a:ext cx="270874" cy="2746166"/>
           </a:xfrm>
           <a:prstGeom prst="rect">
             <a:avLst/>
@@ -5298,10 +5343,19 @@
             <a:schemeClr val="lt1"/>
           </a:fontRef>
         </p:style>
+        <p:txBody>
+          <a:bodyPr anchor="ctr"/>
+          <a:p>
+            <a:pPr algn="ctr">
+              <a:defRPr/>
+            </a:pPr>
+            <a:endParaRPr sz="2400"/>
+          </a:p>
+        </p:txBody>
       </p:sp>
       <p:pic>
         <p:nvPicPr>
-          <p:cNvPr id="1123927146" name=""/>
+          <p:cNvPr id="2095789348" name=""/>
           <p:cNvPicPr>
             <a:picLocks noChangeAspect="1"/>
           </p:cNvPicPr>
@@ -5313,8 +5367,8 @@
         </p:blipFill>
         <p:spPr bwMode="auto">
           <a:xfrm>
-            <a:off x="259772" y="-729837"/>
-            <a:ext cx="3924299" cy="8543925"/>
+            <a:off x="259772" y="-828674"/>
+            <a:ext cx="3914775" cy="8515350"/>
           </a:xfrm>
           <a:prstGeom prst="rect">
             <a:avLst/>
@@ -5356,7 +5410,7 @@
       </p:grpSpPr>
       <p:sp>
         <p:nvSpPr>
-          <p:cNvPr id="1538172507" name="Title 1"/>
+          <p:cNvPr id="900910781" name="Title 1"/>
           <p:cNvSpPr>
             <a:spLocks noGrp="1"/>
           </p:cNvSpPr>
@@ -5378,16 +5432,16 @@
               <a:defRPr/>
             </a:pPr>
             <a:r>
-              <a:rPr lang="es-MX"/>
-              <a:t>Corrección 002</a:t>
-            </a:r>
-            <a:endParaRPr/>
-          </a:p>
-        </p:txBody>
-      </p:sp>
-      <p:sp>
-        <p:nvSpPr>
-          <p:cNvPr id="640060869" name="Marcador de contenido 2"/>
+              <a:rPr lang="es-MX" sz="2400"/>
+              <a:t>Corrección 011</a:t>
+            </a:r>
+            <a:endParaRPr sz="2400"/>
+          </a:p>
+        </p:txBody>
+      </p:sp>
+      <p:sp>
+        <p:nvSpPr>
+          <p:cNvPr id="1228945571" name="Marcador de contenido 2"/>
           <p:cNvSpPr>
             <a:spLocks noGrp="1"/>
           </p:cNvSpPr>
@@ -5413,7 +5467,7 @@
               <a:defRPr/>
             </a:pPr>
             <a:r>
-              <a:rPr lang="es-ES" sz="2700" b="0" i="0" u="none" strike="noStrike" cap="none" spc="0">
+              <a:rPr lang="es-ES" sz="2400" b="0" i="0" u="none" strike="noStrike" cap="none" spc="0">
                 <a:solidFill>
                   <a:schemeClr val="tx1"/>
                 </a:solidFill>
@@ -5423,7 +5477,7 @@
               </a:rPr>
               <a:t>llevar a mal andar</a:t>
             </a:r>
-            <a:endParaRPr lang="es-ES" sz="2700" b="0" i="0" u="none" strike="noStrike" cap="none" spc="0">
+            <a:endParaRPr sz="2400" b="0" i="0" u="none" strike="noStrike" cap="none" spc="0">
               <a:solidFill>
                 <a:schemeClr val="tx1"/>
               </a:solidFill>
@@ -5439,7 +5493,7 @@
               <a:defRPr/>
             </a:pPr>
             <a:r>
-              <a:rPr lang="es-ES" sz="2700" b="0" i="0" u="none" strike="noStrike" cap="none" spc="0">
+              <a:rPr lang="es-ES" sz="2400" b="0" i="0" u="none" strike="noStrike" cap="none" spc="0">
                 <a:solidFill>
                   <a:schemeClr val="tx1"/>
                 </a:solidFill>
@@ -5449,7 +5503,7 @@
               </a:rPr>
               <a:t>loc. verb.</a:t>
             </a:r>
-            <a:endParaRPr lang="es-ES" sz="2700" b="0" i="0" u="none" strike="noStrike" cap="none" spc="0">
+            <a:endParaRPr sz="2400" b="0" i="0" u="none" strike="noStrike" cap="none" spc="0">
               <a:solidFill>
                 <a:schemeClr val="tx1"/>
               </a:solidFill>
@@ -5464,7 +5518,7 @@
               <a:defRPr/>
             </a:pPr>
             <a:r>
-              <a:rPr lang="es-ES" sz="2700" b="0" i="0" u="none" strike="noStrike" cap="none" spc="0">
+              <a:rPr lang="es-ES" sz="2400" b="0" i="0" u="none" strike="noStrike" cap="none" spc="0">
                 <a:solidFill>
                   <a:schemeClr val="tx1"/>
                 </a:solidFill>
@@ -5474,7 +5528,7 @@
               </a:rPr>
               <a:t>Turbar el ánimo a una persona:</a:t>
             </a:r>
-            <a:endParaRPr lang="es-ES" sz="2700" b="0" i="0" u="none" strike="noStrike" cap="none" spc="0">
+            <a:endParaRPr sz="2400" b="0" i="0" u="none" strike="noStrike" cap="none" spc="0">
               <a:solidFill>
                 <a:schemeClr val="tx1"/>
               </a:solidFill>
@@ -5489,7 +5543,7 @@
               <a:defRPr/>
             </a:pPr>
             <a:r>
-              <a:rPr lang="es-ES" sz="2700" b="0" i="0" u="none" strike="noStrike" cap="none" spc="0">
+              <a:rPr lang="es-ES" sz="2400" b="0" i="0" u="none" strike="noStrike" cap="none" spc="0">
                 <a:solidFill>
                   <a:schemeClr val="tx1"/>
                 </a:solidFill>
@@ -5499,13 +5553,13 @@
               </a:rPr>
               <a:t>— Esos problemas que tienes en el trabajo los llevas a mal andar. Deberías ir a terapia.[Ad hoc]</a:t>
             </a:r>
-            <a:endParaRPr/>
-          </a:p>
-        </p:txBody>
-      </p:sp>
-      <p:sp>
-        <p:nvSpPr>
-          <p:cNvPr id="615470839" name=""/>
+            <a:endParaRPr sz="2400"/>
+          </a:p>
+        </p:txBody>
+      </p:sp>
+      <p:sp>
+        <p:nvSpPr>
+          <p:cNvPr id="2124137963" name=""/>
           <p:cNvSpPr/>
           <p:nvPr/>
         </p:nvSpPr>
@@ -5534,10 +5588,19 @@
             <a:schemeClr val="lt1"/>
           </a:fontRef>
         </p:style>
+        <p:txBody>
+          <a:bodyPr anchor="ctr"/>
+          <a:p>
+            <a:pPr algn="ctr">
+              <a:defRPr/>
+            </a:pPr>
+            <a:endParaRPr sz="2400"/>
+          </a:p>
+        </p:txBody>
       </p:sp>
       <p:pic>
         <p:nvPicPr>
-          <p:cNvPr id="221249691" name=""/>
+          <p:cNvPr id="1079578415" name=""/>
           <p:cNvPicPr>
             <a:picLocks noChangeAspect="1"/>
           </p:cNvPicPr>
@@ -5592,7 +5655,7 @@
       </p:grpSpPr>
       <p:sp>
         <p:nvSpPr>
-          <p:cNvPr id="1486011150" name="Title 1"/>
+          <p:cNvPr id="1592064096" name="Title 1"/>
           <p:cNvSpPr>
             <a:spLocks noGrp="1"/>
           </p:cNvSpPr>
@@ -5614,16 +5677,16 @@
               <a:defRPr/>
             </a:pPr>
             <a:r>
-              <a:rPr lang="es-MX"/>
-              <a:t>Corrección 002</a:t>
-            </a:r>
-            <a:endParaRPr/>
-          </a:p>
-        </p:txBody>
-      </p:sp>
-      <p:sp>
-        <p:nvSpPr>
-          <p:cNvPr id="2003397192" name="Marcador de contenido 2"/>
+              <a:rPr lang="es-MX" sz="2400"/>
+              <a:t>Corrección 012</a:t>
+            </a:r>
+            <a:endParaRPr sz="2400"/>
+          </a:p>
+        </p:txBody>
+      </p:sp>
+      <p:sp>
+        <p:nvSpPr>
+          <p:cNvPr id="649825390" name="Marcador de contenido 2"/>
           <p:cNvSpPr>
             <a:spLocks noGrp="1"/>
           </p:cNvSpPr>
@@ -5649,7 +5712,7 @@
               <a:defRPr/>
             </a:pPr>
             <a:r>
-              <a:rPr lang="es-ES" sz="2700" b="0" i="0" u="none" strike="noStrike" cap="none" spc="0">
+              <a:rPr lang="es-ES" sz="2400" b="0" i="0" u="none" strike="noStrike" cap="none" spc="0">
                 <a:solidFill>
                   <a:schemeClr val="tx1"/>
                 </a:solidFill>
@@ -5659,7 +5722,7 @@
               </a:rPr>
               <a:t>taza del baño</a:t>
             </a:r>
-            <a:endParaRPr lang="es-ES" sz="2700" b="0" i="0" u="none" strike="noStrike" cap="none" spc="0">
+            <a:endParaRPr sz="2400" b="0" i="0" u="none" strike="noStrike" cap="none" spc="0">
               <a:solidFill>
                 <a:schemeClr val="tx1"/>
               </a:solidFill>
@@ -5674,7 +5737,7 @@
               <a:defRPr/>
             </a:pPr>
             <a:r>
-              <a:rPr lang="es-ES" sz="2700" b="0" i="0" u="none" strike="noStrike" cap="none" spc="0">
+              <a:rPr lang="es-ES" sz="2400" b="0" i="0" u="none" strike="noStrike" cap="none" spc="0">
                 <a:solidFill>
                   <a:schemeClr val="tx1"/>
                 </a:solidFill>
@@ -5684,7 +5747,7 @@
               </a:rPr>
               <a:t>f.</a:t>
             </a:r>
-            <a:endParaRPr lang="es-ES" sz="2700" b="0" i="0" u="none" strike="noStrike" cap="none" spc="0">
+            <a:endParaRPr sz="2400" b="0" i="0" u="none" strike="noStrike" cap="none" spc="0">
               <a:solidFill>
                 <a:schemeClr val="tx1"/>
               </a:solidFill>
@@ -5699,7 +5762,7 @@
               <a:defRPr/>
             </a:pPr>
             <a:r>
-              <a:rPr lang="es-ES" sz="2700" b="0" i="0" u="none" strike="noStrike" cap="none" spc="0">
+              <a:rPr lang="es-ES" sz="2400" b="0" i="0" u="none" strike="noStrike" cap="none" spc="0">
                 <a:solidFill>
                   <a:schemeClr val="tx1"/>
                 </a:solidFill>
@@ -5709,7 +5772,7 @@
               </a:rPr>
               <a:t>Aparato sanitario para evacuar orina y excrementos; inodoro</a:t>
             </a:r>
-            <a:endParaRPr lang="es-ES" sz="2700" b="0" i="0" u="none" strike="noStrike" cap="none" spc="0">
+            <a:endParaRPr sz="2400" b="0" i="0" u="none" strike="noStrike" cap="none" spc="0">
               <a:solidFill>
                 <a:schemeClr val="tx1"/>
               </a:solidFill>
@@ -5724,7 +5787,7 @@
               <a:defRPr/>
             </a:pPr>
             <a:r>
-              <a:rPr lang="es-ES" sz="2700" b="0" i="0" u="none" strike="noStrike" cap="none" spc="0">
+              <a:rPr lang="es-ES" sz="2400" b="0" i="0" u="none" strike="noStrike" cap="none" spc="0">
                 <a:solidFill>
                   <a:schemeClr val="tx1"/>
                 </a:solidFill>
@@ -5734,13 +5797,13 @@
               </a:rPr>
               <a:t>—M se sienta, todavía adormilada, en la taza del baño y orina. Miguel Donoso Pareja, Hoy empiezo a acordarme.</a:t>
             </a:r>
-            <a:endParaRPr/>
-          </a:p>
-        </p:txBody>
-      </p:sp>
-      <p:sp>
-        <p:nvSpPr>
-          <p:cNvPr id="1195731960" name=""/>
+            <a:endParaRPr sz="2400"/>
+          </a:p>
+        </p:txBody>
+      </p:sp>
+      <p:sp>
+        <p:nvSpPr>
+          <p:cNvPr id="1689819446" name=""/>
           <p:cNvSpPr/>
           <p:nvPr/>
         </p:nvSpPr>
@@ -5769,10 +5832,19 @@
             <a:schemeClr val="lt1"/>
           </a:fontRef>
         </p:style>
+        <p:txBody>
+          <a:bodyPr anchor="ctr"/>
+          <a:p>
+            <a:pPr algn="ctr">
+              <a:defRPr/>
+            </a:pPr>
+            <a:endParaRPr sz="2400"/>
+          </a:p>
+        </p:txBody>
       </p:sp>
       <p:pic>
         <p:nvPicPr>
-          <p:cNvPr id="1797306044" name=""/>
+          <p:cNvPr id="1532019289" name=""/>
           <p:cNvPicPr>
             <a:picLocks noChangeAspect="1"/>
           </p:cNvPicPr>
@@ -5784,7 +5856,7 @@
         </p:blipFill>
         <p:spPr bwMode="auto">
           <a:xfrm>
-            <a:off x="259772" y="-878279"/>
+            <a:off x="259772" y="-878278"/>
             <a:ext cx="3914775" cy="8505824"/>
           </a:xfrm>
           <a:prstGeom prst="rect">
@@ -5827,7 +5899,7 @@
       </p:grpSpPr>
       <p:sp>
         <p:nvSpPr>
-          <p:cNvPr id="1994191802" name="Title 1"/>
+          <p:cNvPr id="880415154" name="Title 1"/>
           <p:cNvSpPr>
             <a:spLocks noGrp="1"/>
           </p:cNvSpPr>
@@ -5849,16 +5921,16 @@
               <a:defRPr/>
             </a:pPr>
             <a:r>
-              <a:rPr lang="es-MX"/>
-              <a:t>Corrección 002</a:t>
-            </a:r>
-            <a:endParaRPr/>
-          </a:p>
-        </p:txBody>
-      </p:sp>
-      <p:sp>
-        <p:nvSpPr>
-          <p:cNvPr id="1159486570" name="Marcador de contenido 2"/>
+              <a:rPr lang="es-MX" sz="2400"/>
+              <a:t>Corrección 013</a:t>
+            </a:r>
+            <a:endParaRPr sz="2400"/>
+          </a:p>
+        </p:txBody>
+      </p:sp>
+      <p:sp>
+        <p:nvSpPr>
+          <p:cNvPr id="1412881347" name="Marcador de contenido 2"/>
           <p:cNvSpPr>
             <a:spLocks noGrp="1"/>
           </p:cNvSpPr>
@@ -5884,7 +5956,7 @@
               <a:defRPr/>
             </a:pPr>
             <a:r>
-              <a:rPr lang="es-ES" sz="2700" b="0" i="0" u="none" strike="noStrike" cap="none" spc="0">
+              <a:rPr lang="es-ES" sz="2400" b="0" i="0" u="none" strike="noStrike" cap="none" spc="0">
                 <a:solidFill>
                   <a:schemeClr val="tx1"/>
                 </a:solidFill>
@@ -5894,7 +5966,7 @@
               </a:rPr>
               <a:t>trinquete</a:t>
             </a:r>
-            <a:endParaRPr lang="es-ES" sz="2700" b="0" i="0" u="none" strike="noStrike" cap="none" spc="0">
+            <a:endParaRPr sz="2400" b="0" i="0" u="none" strike="noStrike" cap="none" spc="0">
               <a:solidFill>
                 <a:schemeClr val="tx1"/>
               </a:solidFill>
@@ -5909,7 +5981,7 @@
               <a:defRPr/>
             </a:pPr>
             <a:r>
-              <a:rPr lang="es-ES" sz="2700" b="0" i="0" u="none" strike="noStrike" cap="none" spc="0">
+              <a:rPr lang="es-ES" sz="2400" b="0" i="0" u="none" strike="noStrike" cap="none" spc="0">
                 <a:solidFill>
                   <a:schemeClr val="tx1"/>
                 </a:solidFill>
@@ -5919,7 +5991,7 @@
               </a:rPr>
               <a:t>2. obsol. Aldabilla con que se aseguran las puertas: </a:t>
             </a:r>
-            <a:endParaRPr lang="es-ES" sz="2700" b="0" i="0" u="none" strike="noStrike" cap="none" spc="0">
+            <a:endParaRPr sz="2400" b="0" i="0" u="none" strike="noStrike" cap="none" spc="0">
               <a:solidFill>
                 <a:schemeClr val="tx1"/>
               </a:solidFill>
@@ -5934,7 +6006,7 @@
               <a:defRPr/>
             </a:pPr>
             <a:r>
-              <a:rPr lang="es-ES" sz="2700" b="0" i="0" u="none" strike="noStrike" cap="none" spc="0">
+              <a:rPr lang="es-ES" sz="2400" b="0" i="0" u="none" strike="noStrike" cap="none" spc="0">
                 <a:solidFill>
                   <a:schemeClr val="tx1"/>
                 </a:solidFill>
@@ -5944,13 +6016,13 @@
               </a:rPr>
               <a:t>—Tienes que poner el trinquete para que la puerta de tu habitación no se abra y estés seguro dentro de ella. Aquí los ladrones abundan y suelen robar durante la noche. [Ad hoc]</a:t>
             </a:r>
-            <a:endParaRPr/>
-          </a:p>
-        </p:txBody>
-      </p:sp>
-      <p:sp>
-        <p:nvSpPr>
-          <p:cNvPr id="567485335" name=""/>
+            <a:endParaRPr sz="2400"/>
+          </a:p>
+        </p:txBody>
+      </p:sp>
+      <p:sp>
+        <p:nvSpPr>
+          <p:cNvPr id="1318255363" name=""/>
           <p:cNvSpPr/>
           <p:nvPr/>
         </p:nvSpPr>
@@ -5979,10 +6051,19 @@
             <a:schemeClr val="lt1"/>
           </a:fontRef>
         </p:style>
+        <p:txBody>
+          <a:bodyPr anchor="ctr"/>
+          <a:p>
+            <a:pPr algn="ctr">
+              <a:defRPr/>
+            </a:pPr>
+            <a:endParaRPr sz="2400"/>
+          </a:p>
+        </p:txBody>
       </p:sp>
       <p:pic>
         <p:nvPicPr>
-          <p:cNvPr id="2070076507" name=""/>
+          <p:cNvPr id="1481017531" name=""/>
           <p:cNvPicPr>
             <a:picLocks noChangeAspect="1"/>
           </p:cNvPicPr>
@@ -6037,7 +6118,7 @@
       </p:grpSpPr>
       <p:sp>
         <p:nvSpPr>
-          <p:cNvPr id="582336961" name="Title 1"/>
+          <p:cNvPr id="2021561544" name="Title 1"/>
           <p:cNvSpPr>
             <a:spLocks noGrp="1"/>
           </p:cNvSpPr>
@@ -6059,16 +6140,16 @@
               <a:defRPr/>
             </a:pPr>
             <a:r>
-              <a:rPr lang="es-MX"/>
-              <a:t>Corrección 002</a:t>
-            </a:r>
-            <a:endParaRPr/>
-          </a:p>
-        </p:txBody>
-      </p:sp>
-      <p:sp>
-        <p:nvSpPr>
-          <p:cNvPr id="411112421" name="Marcador de contenido 2"/>
+              <a:rPr lang="es-MX" sz="2400"/>
+              <a:t>Corrección 014</a:t>
+            </a:r>
+            <a:endParaRPr sz="2400"/>
+          </a:p>
+        </p:txBody>
+      </p:sp>
+      <p:sp>
+        <p:nvSpPr>
+          <p:cNvPr id="224800694" name="Marcador de contenido 2"/>
           <p:cNvSpPr>
             <a:spLocks noGrp="1"/>
           </p:cNvSpPr>
@@ -6084,7 +6165,7 @@
         </p:spPr>
         <p:txBody>
           <a:bodyPr vertOverflow="overflow" horzOverflow="overflow" vert="horz" wrap="square" lIns="91440" tIns="45720" rIns="91440" bIns="45720" numCol="1" spcCol="0" rtlCol="0" fromWordArt="0" anchor="t" anchorCtr="0" forceAA="0" upright="0" compatLnSpc="0">
-            <a:normAutofit fontScale="90000" lnSpcReduction="2000"/>
+            <a:normAutofit/>
           </a:bodyPr>
           <a:lstStyle/>
           <a:p>
@@ -6094,7 +6175,7 @@
               <a:defRPr/>
             </a:pPr>
             <a:r>
-              <a:rPr lang="es-ES" sz="2700" b="0" i="0" u="none" strike="noStrike" cap="none" spc="0">
+              <a:rPr lang="es-ES" sz="2400" b="0" i="0" u="none" strike="noStrike" cap="none" spc="0">
                 <a:solidFill>
                   <a:schemeClr val="tx1"/>
                 </a:solidFill>
@@ -6104,7 +6185,7 @@
               </a:rPr>
               <a:t>relajero, -a</a:t>
             </a:r>
-            <a:endParaRPr lang="es-ES" sz="2700" b="0" i="0" u="none" strike="noStrike" cap="none" spc="0">
+            <a:endParaRPr sz="2400" b="0" i="0" u="none" strike="noStrike" cap="none" spc="0">
               <a:solidFill>
                 <a:schemeClr val="tx1"/>
               </a:solidFill>
@@ -6119,7 +6200,7 @@
               <a:defRPr/>
             </a:pPr>
             <a:r>
-              <a:rPr lang="es-ES" sz="2700" b="0" i="0" u="none" strike="noStrike" cap="none" spc="0">
+              <a:rPr lang="es-ES" sz="2400" b="0" i="0" u="none" strike="noStrike" cap="none" spc="0">
                 <a:solidFill>
                   <a:schemeClr val="tx1"/>
                 </a:solidFill>
@@ -6129,7 +6210,7 @@
               </a:rPr>
               <a:t>m. y f.</a:t>
             </a:r>
-            <a:endParaRPr lang="es-ES" sz="2700" b="0" i="0" u="none" strike="noStrike" cap="none" spc="0">
+            <a:endParaRPr sz="2400" b="0" i="0" u="none" strike="noStrike" cap="none" spc="0">
               <a:solidFill>
                 <a:schemeClr val="tx1"/>
               </a:solidFill>
@@ -6144,7 +6225,7 @@
               <a:defRPr/>
             </a:pPr>
             <a:r>
-              <a:rPr lang="es-ES" sz="2700" b="0" i="0" u="none" strike="noStrike" cap="none" spc="0">
+              <a:rPr lang="es-ES" sz="2400" b="0" i="0" u="none" strike="noStrike" cap="none" spc="0">
                 <a:solidFill>
                   <a:schemeClr val="tx1"/>
                 </a:solidFill>
@@ -6154,7 +6235,7 @@
               </a:rPr>
               <a:t>pop.U.t.c.adj.Persona que causa alboroto, bullicio o desorden:</a:t>
             </a:r>
-            <a:endParaRPr lang="es-ES" sz="2700" b="0" i="0" u="none" strike="noStrike" cap="none" spc="0">
+            <a:endParaRPr sz="2400" b="0" i="0" u="none" strike="noStrike" cap="none" spc="0">
               <a:solidFill>
                 <a:schemeClr val="tx1"/>
               </a:solidFill>
@@ -6169,7 +6250,7 @@
               <a:defRPr/>
             </a:pPr>
             <a:r>
-              <a:rPr lang="es-ES" sz="2700" b="0" i="0" u="none" strike="noStrike" cap="none" spc="0">
+              <a:rPr lang="es-ES" sz="2400" b="0" i="0" u="none" strike="noStrike" cap="none" spc="0">
                 <a:solidFill>
                   <a:schemeClr val="tx1"/>
                 </a:solidFill>
@@ -6179,7 +6260,7 @@
               </a:rPr>
               <a:t>— Le apostaron a Justin Barcia, “por ser el típico gringo relajero, de pelo largo, que tiene la reputación de chico malo, pero es un buen deportista y muy disciplinado”. [Web], motociclismo.ec, 16.05.2021.</a:t>
             </a:r>
-            <a:endParaRPr lang="es-ES" sz="2700" b="0" i="0" u="none" strike="noStrike" cap="none" spc="0">
+            <a:endParaRPr sz="2400" b="0" i="0" u="none" strike="noStrike" cap="none" spc="0">
               <a:solidFill>
                 <a:schemeClr val="tx1"/>
               </a:solidFill>
@@ -6194,7 +6275,7 @@
               <a:defRPr/>
             </a:pPr>
             <a:r>
-              <a:rPr lang="es-ES" sz="2700" b="0" i="0" u="none" strike="noStrike" cap="none" spc="0">
+              <a:rPr lang="es-ES" sz="2400" b="0" i="0" u="none" strike="noStrike" cap="none" spc="0">
                 <a:solidFill>
                   <a:schemeClr val="tx1"/>
                 </a:solidFill>
@@ -6204,13 +6285,13 @@
               </a:rPr>
               <a:t> (Solo relajero va en negrita)</a:t>
             </a:r>
-            <a:endParaRPr/>
-          </a:p>
-        </p:txBody>
-      </p:sp>
-      <p:sp>
-        <p:nvSpPr>
-          <p:cNvPr id="1127845791" name=""/>
+            <a:endParaRPr sz="2400"/>
+          </a:p>
+        </p:txBody>
+      </p:sp>
+      <p:sp>
+        <p:nvSpPr>
+          <p:cNvPr id="811949278" name=""/>
           <p:cNvSpPr/>
           <p:nvPr/>
         </p:nvSpPr>
@@ -6239,10 +6320,19 @@
             <a:schemeClr val="lt1"/>
           </a:fontRef>
         </p:style>
+        <p:txBody>
+          <a:bodyPr anchor="ctr"/>
+          <a:p>
+            <a:pPr algn="ctr">
+              <a:defRPr/>
+            </a:pPr>
+            <a:endParaRPr sz="2400"/>
+          </a:p>
+        </p:txBody>
       </p:sp>
       <p:pic>
         <p:nvPicPr>
-          <p:cNvPr id="360261879" name=""/>
+          <p:cNvPr id="1003726195" name=""/>
           <p:cNvPicPr>
             <a:picLocks noChangeAspect="1"/>
           </p:cNvPicPr>
@@ -6297,7 +6387,7 @@
       </p:grpSpPr>
       <p:sp>
         <p:nvSpPr>
-          <p:cNvPr id="1529683907" name="Title 1"/>
+          <p:cNvPr id="1975238804" name="Title 1"/>
           <p:cNvSpPr>
             <a:spLocks noGrp="1"/>
           </p:cNvSpPr>
@@ -6319,16 +6409,16 @@
               <a:defRPr/>
             </a:pPr>
             <a:r>
-              <a:rPr lang="es-MX"/>
-              <a:t>Corrección 002</a:t>
-            </a:r>
-            <a:endParaRPr/>
-          </a:p>
-        </p:txBody>
-      </p:sp>
-      <p:sp>
-        <p:nvSpPr>
-          <p:cNvPr id="458704198" name="Marcador de contenido 2"/>
+              <a:rPr lang="es-MX" sz="2400"/>
+              <a:t>Corrección 015</a:t>
+            </a:r>
+            <a:endParaRPr sz="2400"/>
+          </a:p>
+        </p:txBody>
+      </p:sp>
+      <p:sp>
+        <p:nvSpPr>
+          <p:cNvPr id="1720618583" name="Marcador de contenido 2"/>
           <p:cNvSpPr>
             <a:spLocks noGrp="1"/>
           </p:cNvSpPr>
@@ -6353,13 +6443,46 @@
               <a:buNone/>
               <a:defRPr/>
             </a:pPr>
-            <a:endParaRPr/>
-          </a:p>
-        </p:txBody>
-      </p:sp>
-      <p:sp>
-        <p:nvSpPr>
-          <p:cNvPr id="945553577" name=""/>
+            <a:r>
+              <a:rPr lang="es-ES" sz="2400" b="0" i="0" u="none" strike="noStrike" cap="none" spc="0">
+                <a:solidFill>
+                  <a:schemeClr val="tx1"/>
+                </a:solidFill>
+                <a:latin typeface="Arial"/>
+                <a:ea typeface="Arial"/>
+                <a:cs typeface="Arial"/>
+              </a:rPr>
+              <a:t>Se corrigió un error de formato en entradas con aclaraciones específicas. En el caso de “cake”, la aclaración del inglés cake, pastel fue normalizada para utilizar únicamente paréntesis, eliminando el uso simultáneo de paréntesis y </a:t>
+            </a:r>
+            <a:r>
+              <a:rPr lang="es-MX" sz="2400" b="0" i="0" u="none" strike="noStrike" cap="none" spc="0">
+                <a:solidFill>
+                  <a:schemeClr val="tx1"/>
+                </a:solidFill>
+                <a:latin typeface="Arial"/>
+                <a:ea typeface="Arial"/>
+                <a:cs typeface="Arial"/>
+              </a:rPr>
+              <a:t>corchetes</a:t>
+            </a:r>
+            <a:r>
+              <a:rPr lang="es-ES" sz="2400" b="0" i="0" u="none" strike="noStrike" cap="none" spc="0">
+                <a:solidFill>
+                  <a:schemeClr val="tx1"/>
+                </a:solidFill>
+                <a:latin typeface="Arial"/>
+                <a:ea typeface="Arial"/>
+                <a:cs typeface="Arial"/>
+              </a:rPr>
+              <a:t>. Este ajuste de formato se aplicó de manera global al resto de las palabras de la base de datos.</a:t>
+            </a:r>
+            <a:endParaRPr sz="2400"/>
+          </a:p>
+        </p:txBody>
+      </p:sp>
+      <p:sp>
+        <p:nvSpPr>
+          <p:cNvPr id="1932280679" name=""/>
           <p:cNvSpPr/>
           <p:nvPr/>
         </p:nvSpPr>
@@ -6388,10 +6511,19 @@
             <a:schemeClr val="lt1"/>
           </a:fontRef>
         </p:style>
+        <p:txBody>
+          <a:bodyPr anchor="ctr"/>
+          <a:p>
+            <a:pPr algn="ctr">
+              <a:defRPr/>
+            </a:pPr>
+            <a:endParaRPr sz="2400"/>
+          </a:p>
+        </p:txBody>
       </p:sp>
       <p:pic>
         <p:nvPicPr>
-          <p:cNvPr id="1685595857" name=""/>
+          <p:cNvPr id="1570095281" name=""/>
           <p:cNvPicPr>
             <a:picLocks noChangeAspect="1"/>
           </p:cNvPicPr>
@@ -6403,7 +6535,7 @@
         </p:blipFill>
         <p:spPr bwMode="auto">
           <a:xfrm>
-            <a:off x="259772" y="-392452"/>
+            <a:off x="259772" y="-392451"/>
             <a:ext cx="3914775" cy="8515350"/>
           </a:xfrm>
           <a:prstGeom prst="rect">
@@ -6446,7 +6578,7 @@
       </p:grpSpPr>
       <p:sp>
         <p:nvSpPr>
-          <p:cNvPr id="1569548488" name="Title 1"/>
+          <p:cNvPr id="18864408" name="Title 1"/>
           <p:cNvSpPr>
             <a:spLocks noGrp="1"/>
           </p:cNvSpPr>
@@ -6468,16 +6600,16 @@
               <a:defRPr/>
             </a:pPr>
             <a:r>
-              <a:rPr lang="es-MX"/>
-              <a:t>Corrección 002</a:t>
-            </a:r>
-            <a:endParaRPr/>
-          </a:p>
-        </p:txBody>
-      </p:sp>
-      <p:sp>
-        <p:nvSpPr>
-          <p:cNvPr id="1863582935" name="Marcador de contenido 2"/>
+              <a:rPr lang="es-MX" sz="2400"/>
+              <a:t>Corrección 016</a:t>
+            </a:r>
+            <a:endParaRPr sz="2400"/>
+          </a:p>
+        </p:txBody>
+      </p:sp>
+      <p:sp>
+        <p:nvSpPr>
+          <p:cNvPr id="1788236179" name="Marcador de contenido 2"/>
           <p:cNvSpPr>
             <a:spLocks noGrp="1"/>
           </p:cNvSpPr>
@@ -6502,13 +6634,24 @@
               <a:buNone/>
               <a:defRPr/>
             </a:pPr>
-            <a:endParaRPr/>
-          </a:p>
-        </p:txBody>
-      </p:sp>
-      <p:sp>
-        <p:nvSpPr>
-          <p:cNvPr id="1854373522" name=""/>
+            <a:r>
+              <a:rPr lang="es-ES" sz="2400" b="0" i="0" u="none" strike="noStrike" cap="none" spc="0">
+                <a:solidFill>
+                  <a:schemeClr val="tx1"/>
+                </a:solidFill>
+                <a:latin typeface="Arial"/>
+                <a:ea typeface="Arial"/>
+                <a:cs typeface="Arial"/>
+              </a:rPr>
+              <a:t>Atendiendo al criterio establecido por el cliente, se realizó una corrección sistemática en las definiciones cuya redacción inicia con “persona”, incorporando la etiqueta UTC: adjetivo. Aunque la incidencia se ejemplifica claramente en la entrada “rocoto”, la corrección fue aplicada de forma uniforme a todas las entradas de la base de datos que cumplen con este patrón definicional.</a:t>
+            </a:r>
+            <a:endParaRPr sz="2400"/>
+          </a:p>
+        </p:txBody>
+      </p:sp>
+      <p:sp>
+        <p:nvSpPr>
+          <p:cNvPr id="436110051" name=""/>
           <p:cNvSpPr/>
           <p:nvPr/>
         </p:nvSpPr>
@@ -6537,10 +6680,19 @@
             <a:schemeClr val="lt1"/>
           </a:fontRef>
         </p:style>
+        <p:txBody>
+          <a:bodyPr anchor="ctr"/>
+          <a:p>
+            <a:pPr algn="ctr">
+              <a:defRPr/>
+            </a:pPr>
+            <a:endParaRPr sz="2400"/>
+          </a:p>
+        </p:txBody>
       </p:sp>
       <p:pic>
         <p:nvPicPr>
-          <p:cNvPr id="1224945539" name=""/>
+          <p:cNvPr id="1433661970" name=""/>
           <p:cNvPicPr>
             <a:picLocks noChangeAspect="1"/>
           </p:cNvPicPr>
@@ -6552,7 +6704,7 @@
         </p:blipFill>
         <p:spPr bwMode="auto">
           <a:xfrm>
-            <a:off x="259772" y="-705097"/>
+            <a:off x="259772" y="-705096"/>
             <a:ext cx="3886200" cy="8477249"/>
           </a:xfrm>
           <a:prstGeom prst="rect">
@@ -6595,7 +6747,7 @@
       </p:grpSpPr>
       <p:sp>
         <p:nvSpPr>
-          <p:cNvPr id="1814923230" name="Title 1"/>
+          <p:cNvPr id="560372204" name="Title 1"/>
           <p:cNvSpPr>
             <a:spLocks noGrp="1"/>
           </p:cNvSpPr>
@@ -6617,16 +6769,16 @@
               <a:defRPr/>
             </a:pPr>
             <a:r>
-              <a:rPr lang="es-MX"/>
-              <a:t>Corrección 002</a:t>
-            </a:r>
-            <a:endParaRPr/>
-          </a:p>
-        </p:txBody>
-      </p:sp>
-      <p:sp>
-        <p:nvSpPr>
-          <p:cNvPr id="490223206" name="Marcador de contenido 2"/>
+              <a:rPr lang="es-MX" sz="2400"/>
+              <a:t>Corrección 017</a:t>
+            </a:r>
+            <a:endParaRPr sz="2400"/>
+          </a:p>
+        </p:txBody>
+      </p:sp>
+      <p:sp>
+        <p:nvSpPr>
+          <p:cNvPr id="651721183" name="Marcador de contenido 2"/>
           <p:cNvSpPr>
             <a:spLocks noGrp="1"/>
           </p:cNvSpPr>
@@ -6651,13 +6803,24 @@
               <a:buNone/>
               <a:defRPr/>
             </a:pPr>
-            <a:endParaRPr/>
-          </a:p>
-        </p:txBody>
-      </p:sp>
-      <p:sp>
-        <p:nvSpPr>
-          <p:cNvPr id="1113969269" name=""/>
+            <a:r>
+              <a:rPr lang="es-ES" sz="2400" b="0" i="0" u="none" strike="noStrike" cap="none" spc="0">
+                <a:solidFill>
+                  <a:schemeClr val="tx1"/>
+                </a:solidFill>
+                <a:latin typeface="Arial"/>
+                <a:ea typeface="Arial"/>
+                <a:cs typeface="Arial"/>
+              </a:rPr>
+              <a:t>Conforme a lo solicitado por el cliente, se incorporó una sección introductoria accesible mediante un pop-up, que incluye un texto de presentación general del diccionario, así como una sección de créditos con equipo de trabajo, puestos y nombres. El contenido se dejó de forma genérica, quedando preparado para la incorporación de la información definitiva que el cliente desee agregar. La sección permanece abierta a futuros ajustes o contenidos adicionales.</a:t>
+            </a:r>
+            <a:endParaRPr sz="2400"/>
+          </a:p>
+        </p:txBody>
+      </p:sp>
+      <p:sp>
+        <p:nvSpPr>
+          <p:cNvPr id="183584547" name=""/>
           <p:cNvSpPr/>
           <p:nvPr/>
         </p:nvSpPr>
@@ -6686,10 +6849,19 @@
             <a:schemeClr val="lt1"/>
           </a:fontRef>
         </p:style>
+        <p:txBody>
+          <a:bodyPr anchor="ctr"/>
+          <a:p>
+            <a:pPr algn="ctr">
+              <a:defRPr/>
+            </a:pPr>
+            <a:endParaRPr sz="2400"/>
+          </a:p>
+        </p:txBody>
       </p:sp>
       <p:pic>
         <p:nvPicPr>
-          <p:cNvPr id="694917173" name=""/>
+          <p:cNvPr id="1997328756" name=""/>
           <p:cNvPicPr>
             <a:picLocks noChangeAspect="1"/>
           </p:cNvPicPr>
@@ -6744,7 +6916,7 @@
       </p:grpSpPr>
       <p:sp>
         <p:nvSpPr>
-          <p:cNvPr id="851840496" name="Title 1"/>
+          <p:cNvPr id="575148151" name="Title 1"/>
           <p:cNvSpPr>
             <a:spLocks noGrp="1"/>
           </p:cNvSpPr>
@@ -6766,16 +6938,16 @@
               <a:defRPr/>
             </a:pPr>
             <a:r>
-              <a:rPr lang="es-MX"/>
-              <a:t>Corrección 001</a:t>
-            </a:r>
-            <a:endParaRPr/>
-          </a:p>
-        </p:txBody>
-      </p:sp>
-      <p:sp>
-        <p:nvSpPr>
-          <p:cNvPr id="63398048" name="Marcador de contenido 2"/>
+              <a:rPr lang="es-MX" sz="2400"/>
+              <a:t>Corrección 002</a:t>
+            </a:r>
+            <a:endParaRPr sz="2400"/>
+          </a:p>
+        </p:txBody>
+      </p:sp>
+      <p:sp>
+        <p:nvSpPr>
+          <p:cNvPr id="1601020049" name="Marcador de contenido 2"/>
           <p:cNvSpPr>
             <a:spLocks noGrp="1"/>
           </p:cNvSpPr>
@@ -6793,16 +6965,48 @@
           <a:bodyPr/>
           <a:lstStyle/>
           <a:p>
-            <a:pPr>
-              <a:defRPr/>
-            </a:pPr>
-            <a:endParaRPr/>
+            <a:pPr marL="0" indent="0">
+              <a:buFont typeface="Arial"/>
+              <a:buNone/>
+              <a:defRPr/>
+            </a:pPr>
+            <a:r>
+              <a:rPr lang="es-ES" sz="2400" b="0" i="0" u="none" strike="noStrike" cap="none" spc="0">
+                <a:solidFill>
+                  <a:schemeClr val="tx1"/>
+                </a:solidFill>
+                <a:latin typeface="Arial"/>
+                <a:ea typeface="Arial"/>
+                <a:cs typeface="Arial"/>
+              </a:rPr>
+              <a:t>Se corrigió la entrada “fueteada”, incorporando una coincidencia con “fuete” que redirige directamente a su definición correspondiente.</a:t>
+            </a:r>
+            <a:endParaRPr sz="2400"/>
+          </a:p>
+          <a:p>
+            <a:pPr marL="0" indent="0">
+              <a:buFont typeface="Arial"/>
+              <a:buNone/>
+              <a:defRPr/>
+            </a:pPr>
+            <a:r>
+              <a:rPr lang="es-ES" sz="2400" b="0" i="0" u="none" strike="noStrike" cap="none" spc="0">
+                <a:solidFill>
+                  <a:schemeClr val="tx1"/>
+                </a:solidFill>
+                <a:latin typeface="Arial"/>
+                <a:ea typeface="Arial"/>
+                <a:cs typeface="Arial"/>
+              </a:rPr>
+              <a:t>Si bien la incidencia fue detectada en estos términos concretos, el mismo criterio de corrección y enlazado se extendió de manera sistemática a la totalidad de las entradas de la base de datos de la aplicación.</a:t>
+            </a:r>
+            <a:endParaRPr sz="2400"/>
           </a:p>
         </p:txBody>
       </p:sp>
       <p:pic>
         <p:nvPicPr>
-          <p:cNvPr id="267921952" name=""/>
+          <p:cNvPr id="551871601" name=""/>
           <p:cNvPicPr>
             <a:picLocks noChangeAspect="1"/>
           </p:cNvPicPr>
@@ -6814,8 +7018,8 @@
         </p:blipFill>
         <p:spPr bwMode="auto">
           <a:xfrm>
-            <a:off x="259772" y="0"/>
-            <a:ext cx="3962399" cy="8553449"/>
+            <a:off x="259772" y="-294480"/>
+            <a:ext cx="4038598" cy="8591549"/>
           </a:xfrm>
           <a:prstGeom prst="rect">
             <a:avLst/>
@@ -6824,14 +7028,14 @@
       </p:pic>
       <p:sp>
         <p:nvSpPr>
-          <p:cNvPr id="419543473" name=""/>
+          <p:cNvPr id="428966424" name=""/>
           <p:cNvSpPr/>
           <p:nvPr/>
         </p:nvSpPr>
         <p:spPr bwMode="auto">
           <a:xfrm rot="0" flipH="0" flipV="0">
-            <a:off x="-11103" y="1719447"/>
-            <a:ext cx="270876" cy="2746168"/>
+            <a:off x="-11102" y="1719447"/>
+            <a:ext cx="270875" cy="2746167"/>
           </a:xfrm>
           <a:prstGeom prst="rect">
             <a:avLst/>
@@ -6853,6 +7057,15 @@
             <a:schemeClr val="lt1"/>
           </a:fontRef>
         </p:style>
+        <p:txBody>
+          <a:bodyPr anchor="ctr"/>
+          <a:p>
+            <a:pPr algn="ctr">
+              <a:defRPr/>
+            </a:pPr>
+            <a:endParaRPr sz="2400"/>
+          </a:p>
+        </p:txBody>
       </p:sp>
     </p:spTree>
   </p:cSld>
@@ -6889,7 +7102,7 @@
       </p:grpSpPr>
       <p:sp>
         <p:nvSpPr>
-          <p:cNvPr id="1690996647" name="Title 1"/>
+          <p:cNvPr id="1986892581" name="Title 1"/>
           <p:cNvSpPr>
             <a:spLocks noGrp="1"/>
           </p:cNvSpPr>
@@ -6911,16 +7124,16 @@
               <a:defRPr/>
             </a:pPr>
             <a:r>
-              <a:rPr lang="es-MX"/>
-              <a:t>Corrección 002</a:t>
-            </a:r>
-            <a:endParaRPr/>
-          </a:p>
-        </p:txBody>
-      </p:sp>
-      <p:sp>
-        <p:nvSpPr>
-          <p:cNvPr id="2076472005" name="Marcador de contenido 2"/>
+              <a:rPr lang="es-MX" sz="2400"/>
+              <a:t>Corrección 003</a:t>
+            </a:r>
+            <a:endParaRPr sz="2400"/>
+          </a:p>
+        </p:txBody>
+      </p:sp>
+      <p:sp>
+        <p:nvSpPr>
+          <p:cNvPr id="1130650053" name="Marcador de contenido 2"/>
           <p:cNvSpPr>
             <a:spLocks noGrp="1"/>
           </p:cNvSpPr>
@@ -6935,41 +7148,53 @@
           </a:xfrm>
         </p:spPr>
         <p:txBody>
-          <a:bodyPr/>
-          <a:lstStyle/>
-          <a:p>
-            <a:pPr>
-              <a:defRPr/>
-            </a:pPr>
-            <a:endParaRPr/>
-          </a:p>
-        </p:txBody>
-      </p:sp>
-      <p:pic>
-        <p:nvPicPr>
-          <p:cNvPr id="747993732" name=""/>
-          <p:cNvPicPr>
-            <a:picLocks noChangeAspect="1"/>
-          </p:cNvPicPr>
-          <p:nvPr/>
-        </p:nvPicPr>
-        <p:blipFill rotWithShape="1">
-          <a:blip r:embed="rId3"/>
-          <a:stretch/>
-        </p:blipFill>
-        <p:spPr bwMode="auto">
-          <a:xfrm>
-            <a:off x="259772" y="-294480"/>
-            <a:ext cx="4038599" cy="8591549"/>
-          </a:xfrm>
-          <a:prstGeom prst="rect">
-            <a:avLst/>
-          </a:prstGeom>
-        </p:spPr>
-      </p:pic>
-      <p:sp>
-        <p:nvSpPr>
-          <p:cNvPr id="851496118" name=""/>
+          <a:bodyPr vertOverflow="overflow" horzOverflow="overflow" vert="horz" wrap="square" lIns="91440" tIns="45720" rIns="91440" bIns="45720" numCol="1" spcCol="0" rtlCol="0" fromWordArt="0" anchor="t" anchorCtr="0" forceAA="0" upright="0" compatLnSpc="0">
+            <a:normAutofit/>
+          </a:bodyPr>
+          <a:lstStyle/>
+          <a:p>
+            <a:pPr marL="0" indent="0">
+              <a:buFont typeface="Arial"/>
+              <a:buNone/>
+              <a:defRPr/>
+            </a:pPr>
+            <a:r>
+              <a:rPr lang="es-ES" sz="2400" b="0" i="0" u="none" strike="noStrike" cap="none" spc="0">
+                <a:solidFill>
+                  <a:schemeClr val="tx1"/>
+                </a:solidFill>
+                <a:latin typeface="Arial"/>
+                <a:ea typeface="Arial"/>
+                <a:cs typeface="Arial"/>
+              </a:rPr>
+              <a:t>Se realizó una corrección en la entrada “fanesca”, estableciendo enlaces directos para las coincidencias léxicas “zapayo” y “zambo” hacia sus respectivas definiciones.</a:t>
+            </a:r>
+            <a:endParaRPr sz="2400"/>
+          </a:p>
+          <a:p>
+            <a:pPr marL="0" indent="0">
+              <a:buFont typeface="Arial"/>
+              <a:buNone/>
+              <a:defRPr/>
+            </a:pPr>
+            <a:r>
+              <a:rPr lang="es-ES" sz="2400" b="0" i="0" u="none" strike="noStrike" cap="none" spc="0">
+                <a:solidFill>
+                  <a:schemeClr val="tx1"/>
+                </a:solidFill>
+                <a:latin typeface="Arial"/>
+                <a:ea typeface="Arial"/>
+                <a:cs typeface="Arial"/>
+              </a:rPr>
+              <a:t>Si bien la incidencia fue detectada en estos términos concretos, el mismo criterio de corrección y enlazado se extendió de manera sistemática a la totalidad de las entradas de la base de datos de la aplicación.</a:t>
+            </a:r>
+            <a:endParaRPr sz="2400"/>
+          </a:p>
+        </p:txBody>
+      </p:sp>
+      <p:sp>
+        <p:nvSpPr>
+          <p:cNvPr id="339072094" name=""/>
           <p:cNvSpPr/>
           <p:nvPr/>
         </p:nvSpPr>
@@ -6998,7 +7223,38 @@
             <a:schemeClr val="lt1"/>
           </a:fontRef>
         </p:style>
-      </p:sp>
+        <p:txBody>
+          <a:bodyPr anchor="ctr"/>
+          <a:p>
+            <a:pPr algn="ctr">
+              <a:defRPr/>
+            </a:pPr>
+            <a:endParaRPr sz="2400"/>
+          </a:p>
+        </p:txBody>
+      </p:sp>
+      <p:pic>
+        <p:nvPicPr>
+          <p:cNvPr id="1329343622" name=""/>
+          <p:cNvPicPr>
+            <a:picLocks noChangeAspect="1"/>
+          </p:cNvPicPr>
+          <p:nvPr/>
+        </p:nvPicPr>
+        <p:blipFill rotWithShape="1">
+          <a:blip r:embed="rId3"/>
+          <a:stretch/>
+        </p:blipFill>
+        <p:spPr bwMode="auto">
+          <a:xfrm>
+            <a:off x="259772" y="-270668"/>
+            <a:ext cx="3933824" cy="8543925"/>
+          </a:xfrm>
+          <a:prstGeom prst="rect">
+            <a:avLst/>
+          </a:prstGeom>
+        </p:spPr>
+      </p:pic>
     </p:spTree>
   </p:cSld>
   <p:clrMapOvr>
@@ -7034,7 +7290,7 @@
       </p:grpSpPr>
       <p:sp>
         <p:nvSpPr>
-          <p:cNvPr id="1995974854" name="Title 1"/>
+          <p:cNvPr id="286019647" name="Title 1"/>
           <p:cNvSpPr>
             <a:spLocks noGrp="1"/>
           </p:cNvSpPr>
@@ -7056,16 +7312,16 @@
               <a:defRPr/>
             </a:pPr>
             <a:r>
-              <a:rPr lang="es-MX"/>
-              <a:t>Corrección 002</a:t>
-            </a:r>
-            <a:endParaRPr/>
-          </a:p>
-        </p:txBody>
-      </p:sp>
-      <p:sp>
-        <p:nvSpPr>
-          <p:cNvPr id="537374309" name="Marcador de contenido 2"/>
+              <a:rPr lang="es-MX" sz="2400"/>
+              <a:t>Corrección 004</a:t>
+            </a:r>
+            <a:endParaRPr sz="2400"/>
+          </a:p>
+        </p:txBody>
+      </p:sp>
+      <p:sp>
+        <p:nvSpPr>
+          <p:cNvPr id="317668289" name="Marcador de contenido 2"/>
           <p:cNvSpPr>
             <a:spLocks noGrp="1"/>
           </p:cNvSpPr>
@@ -7083,16 +7339,104 @@
           <a:bodyPr/>
           <a:lstStyle/>
           <a:p>
-            <a:pPr>
-              <a:defRPr/>
-            </a:pPr>
-            <a:endParaRPr/>
-          </a:p>
-        </p:txBody>
-      </p:sp>
-      <p:sp>
-        <p:nvSpPr>
-          <p:cNvPr id="107101679" name=""/>
+            <a:pPr marL="0" indent="0">
+              <a:buFont typeface="Arial"/>
+              <a:buNone/>
+              <a:defRPr/>
+            </a:pPr>
+            <a:r>
+              <a:rPr lang="es-MX" sz="2400" b="0" i="0" u="none" strike="noStrike" cap="none" spc="0">
+                <a:solidFill>
+                  <a:schemeClr val="tx1"/>
+                </a:solidFill>
+                <a:latin typeface="Arial"/>
+                <a:ea typeface="Arial"/>
+                <a:cs typeface="Arial"/>
+              </a:rPr>
+              <a:t>papi</a:t>
+            </a:r>
+            <a:endParaRPr sz="2400" b="0" i="0" u="none" strike="noStrike" cap="none" spc="0">
+              <a:solidFill>
+                <a:schemeClr val="tx1"/>
+              </a:solidFill>
+              <a:latin typeface="Arial"/>
+              <a:cs typeface="Arial"/>
+            </a:endParaRPr>
+          </a:p>
+          <a:p>
+            <a:pPr marL="0" indent="0">
+              <a:buFont typeface="Arial"/>
+              <a:buNone/>
+              <a:defRPr/>
+            </a:pPr>
+            <a:r>
+              <a:rPr lang="es-ES" sz="2400" b="0" i="0" u="none" strike="noStrike" cap="none" spc="0">
+                <a:solidFill>
+                  <a:schemeClr val="tx1"/>
+                </a:solidFill>
+                <a:latin typeface="Arial"/>
+                <a:ea typeface="Arial"/>
+                <a:cs typeface="Arial"/>
+              </a:rPr>
+              <a:t>m.</a:t>
+            </a:r>
+            <a:endParaRPr sz="2400" b="0" i="0" u="none" strike="noStrike" cap="none" spc="0">
+              <a:solidFill>
+                <a:schemeClr val="tx1"/>
+              </a:solidFill>
+              <a:latin typeface="Arial"/>
+              <a:cs typeface="Arial"/>
+            </a:endParaRPr>
+          </a:p>
+          <a:p>
+            <a:pPr marL="0" indent="0">
+              <a:buFont typeface="Arial"/>
+              <a:buNone/>
+              <a:defRPr/>
+            </a:pPr>
+            <a:r>
+              <a:rPr lang="es-ES" sz="2400" b="0" i="0" u="none" strike="noStrike" cap="none" spc="0">
+                <a:solidFill>
+                  <a:schemeClr val="tx1"/>
+                </a:solidFill>
+                <a:latin typeface="Arial"/>
+                <a:ea typeface="Arial"/>
+                <a:cs typeface="Arial"/>
+              </a:rPr>
+              <a:t>2. coloq. Tratamiento para dirigirse cariñosamente a la pareja o a un hijo: </a:t>
+            </a:r>
+            <a:endParaRPr sz="2400" b="0" i="0" u="none" strike="noStrike" cap="none" spc="0">
+              <a:solidFill>
+                <a:schemeClr val="tx1"/>
+              </a:solidFill>
+              <a:latin typeface="Arial"/>
+              <a:cs typeface="Arial"/>
+            </a:endParaRPr>
+          </a:p>
+          <a:p>
+            <a:pPr marL="0" indent="0">
+              <a:buFont typeface="Arial"/>
+              <a:buNone/>
+              <a:defRPr/>
+            </a:pPr>
+            <a:r>
+              <a:rPr lang="es-ES" sz="2400" b="0" i="0" u="none" strike="noStrike" cap="none" spc="0">
+                <a:solidFill>
+                  <a:schemeClr val="tx1"/>
+                </a:solidFill>
+                <a:latin typeface="Arial"/>
+                <a:ea typeface="Arial"/>
+                <a:cs typeface="Arial"/>
+              </a:rPr>
+              <a:t>—‘Gracias, papi, por la velada romántica, siempre haces que cada día sea especial a tu lado.</a:t>
+            </a:r>
+            <a:endParaRPr sz="2400"/>
+          </a:p>
+        </p:txBody>
+      </p:sp>
+      <p:sp>
+        <p:nvSpPr>
+          <p:cNvPr id="1562005361" name=""/>
           <p:cNvSpPr/>
           <p:nvPr/>
         </p:nvSpPr>
@@ -7121,10 +7465,19 @@
             <a:schemeClr val="lt1"/>
           </a:fontRef>
         </p:style>
+        <p:txBody>
+          <a:bodyPr anchor="ctr"/>
+          <a:p>
+            <a:pPr algn="ctr">
+              <a:defRPr/>
+            </a:pPr>
+            <a:endParaRPr sz="2400"/>
+          </a:p>
+        </p:txBody>
       </p:sp>
       <p:pic>
         <p:nvPicPr>
-          <p:cNvPr id="1372939862" name=""/>
+          <p:cNvPr id="192857558" name=""/>
           <p:cNvPicPr>
             <a:picLocks noChangeAspect="1"/>
           </p:cNvPicPr>
@@ -7136,8 +7489,8 @@
         </p:blipFill>
         <p:spPr bwMode="auto">
           <a:xfrm>
-            <a:off x="259772" y="-270668"/>
-            <a:ext cx="3933824" cy="8543925"/>
+            <a:off x="259772" y="-265905"/>
+            <a:ext cx="3962399" cy="8534399"/>
           </a:xfrm>
           <a:prstGeom prst="rect">
             <a:avLst/>
@@ -7179,7 +7532,7 @@
       </p:grpSpPr>
       <p:sp>
         <p:nvSpPr>
-          <p:cNvPr id="1200593342" name="Title 1"/>
+          <p:cNvPr id="1088285698" name="Title 1"/>
           <p:cNvSpPr>
             <a:spLocks noGrp="1"/>
           </p:cNvSpPr>
@@ -7201,16 +7554,16 @@
               <a:defRPr/>
             </a:pPr>
             <a:r>
-              <a:rPr lang="es-MX"/>
-              <a:t>Corrección 002</a:t>
-            </a:r>
-            <a:endParaRPr/>
-          </a:p>
-        </p:txBody>
-      </p:sp>
-      <p:sp>
-        <p:nvSpPr>
-          <p:cNvPr id="209639543" name="Marcador de contenido 2"/>
+              <a:rPr lang="es-MX" sz="2400"/>
+              <a:t>Corrección 005</a:t>
+            </a:r>
+            <a:endParaRPr sz="2400"/>
+          </a:p>
+        </p:txBody>
+      </p:sp>
+      <p:sp>
+        <p:nvSpPr>
+          <p:cNvPr id="1099458795" name="Marcador de contenido 2"/>
           <p:cNvSpPr>
             <a:spLocks noGrp="1"/>
           </p:cNvSpPr>
@@ -7234,7 +7587,7 @@
               <a:defRPr/>
             </a:pPr>
             <a:r>
-              <a:rPr lang="es-MX" sz="2800" b="0" i="0" u="none" strike="noStrike" cap="none" spc="0">
+              <a:rPr lang="es-ES" sz="2400" b="0" i="0" u="none" strike="noStrike" cap="none" spc="0">
                 <a:solidFill>
                   <a:schemeClr val="tx1"/>
                 </a:solidFill>
@@ -7242,9 +7595,9 @@
                 <a:ea typeface="Arial"/>
                 <a:cs typeface="Arial"/>
               </a:rPr>
-              <a:t>papi</a:t>
-            </a:r>
-            <a:endParaRPr lang="es-ES" sz="2800" b="0" i="0" u="none" strike="noStrike" cap="none" spc="0">
+              <a:t>rascabonito</a:t>
+            </a:r>
+            <a:endParaRPr sz="2400" b="0" i="0" u="none" strike="noStrike" cap="none" spc="0">
               <a:solidFill>
                 <a:schemeClr val="tx1"/>
               </a:solidFill>
@@ -7259,7 +7612,7 @@
               <a:defRPr/>
             </a:pPr>
             <a:r>
-              <a:rPr lang="es-ES" sz="2800" b="0" i="0" u="none" strike="noStrike" cap="none" spc="0">
+              <a:rPr lang="es-ES" sz="2400" b="0" i="0" u="none" strike="noStrike" cap="none" spc="0">
                 <a:solidFill>
                   <a:schemeClr val="tx1"/>
                 </a:solidFill>
@@ -7269,7 +7622,7 @@
               </a:rPr>
               <a:t>m.</a:t>
             </a:r>
-            <a:endParaRPr lang="es-ES" sz="2800" b="0" i="0" u="none" strike="noStrike" cap="none" spc="0">
+            <a:endParaRPr sz="2400" b="0" i="0" u="none" strike="noStrike" cap="none" spc="0">
               <a:solidFill>
                 <a:schemeClr val="tx1"/>
               </a:solidFill>
@@ -7284,7 +7637,7 @@
               <a:defRPr/>
             </a:pPr>
             <a:r>
-              <a:rPr lang="es-ES" sz="2800" b="0" i="0" u="none" strike="noStrike" cap="none" spc="0">
+              <a:rPr lang="es-ES" sz="2400" b="0" i="0" u="none" strike="noStrike" cap="none" spc="0">
                 <a:solidFill>
                   <a:schemeClr val="tx1"/>
                 </a:solidFill>
@@ -7292,9 +7645,9 @@
                 <a:ea typeface="Arial"/>
                 <a:cs typeface="Arial"/>
               </a:rPr>
-              <a:t>2. coloq. Tratamiento para dirigirse cariñosamente a la pareja o a un hijo: </a:t>
-            </a:r>
-            <a:endParaRPr lang="es-ES" sz="2800" b="0" i="0" u="none" strike="noStrike" cap="none" spc="0">
+              <a:t>Enfermedad cutánea que produce escozor intenso por una reacción alérgica al parásito calemba: </a:t>
+            </a:r>
+            <a:endParaRPr sz="2400" b="0" i="0" u="none" strike="noStrike" cap="none" spc="0">
               <a:solidFill>
                 <a:schemeClr val="tx1"/>
               </a:solidFill>
@@ -7309,7 +7662,7 @@
               <a:defRPr/>
             </a:pPr>
             <a:r>
-              <a:rPr lang="es-ES" sz="2800" b="0" i="0" u="none" strike="noStrike" cap="none" spc="0">
+              <a:rPr lang="es-ES" sz="2400" b="0" i="0" u="none" strike="noStrike" cap="none" spc="0">
                 <a:solidFill>
                   <a:schemeClr val="tx1"/>
                 </a:solidFill>
@@ -7317,15 +7670,15 @@
                 <a:ea typeface="Arial"/>
                 <a:cs typeface="Arial"/>
               </a:rPr>
-              <a:t>—‘Gracias, papi, por la velada romántica, siempre haces que cada día sea especial a tu lado.</a:t>
-            </a:r>
-            <a:endParaRPr/>
-          </a:p>
-        </p:txBody>
-      </p:sp>
-      <p:sp>
-        <p:nvSpPr>
-          <p:cNvPr id="651494575" name=""/>
+              <a:t>—Para el rascabonito machaque unas hojas y coloque en la zona donde están los granitos y deje actuar por 5 minutos. Últimas Noticias, 20.04.2011.</a:t>
+            </a:r>
+            <a:endParaRPr sz="2400"/>
+          </a:p>
+        </p:txBody>
+      </p:sp>
+      <p:sp>
+        <p:nvSpPr>
+          <p:cNvPr id="1305495330" name=""/>
           <p:cNvSpPr/>
           <p:nvPr/>
         </p:nvSpPr>
@@ -7354,10 +7707,19 @@
             <a:schemeClr val="lt1"/>
           </a:fontRef>
         </p:style>
+        <p:txBody>
+          <a:bodyPr anchor="ctr"/>
+          <a:p>
+            <a:pPr algn="ctr">
+              <a:defRPr/>
+            </a:pPr>
+            <a:endParaRPr sz="2400"/>
+          </a:p>
+        </p:txBody>
       </p:sp>
       <p:pic>
         <p:nvPicPr>
-          <p:cNvPr id="108169781" name=""/>
+          <p:cNvPr id="193109764" name=""/>
           <p:cNvPicPr>
             <a:picLocks noChangeAspect="1"/>
           </p:cNvPicPr>
@@ -7369,8 +7731,8 @@
         </p:blipFill>
         <p:spPr bwMode="auto">
           <a:xfrm>
-            <a:off x="259772" y="-265905"/>
-            <a:ext cx="3962399" cy="8534399"/>
+            <a:off x="259772" y="-1193717"/>
+            <a:ext cx="3971925" cy="8572500"/>
           </a:xfrm>
           <a:prstGeom prst="rect">
             <a:avLst/>
@@ -7412,7 +7774,7 @@
       </p:grpSpPr>
       <p:sp>
         <p:nvSpPr>
-          <p:cNvPr id="1440068615" name="Title 1"/>
+          <p:cNvPr id="2071972004" name="Title 1"/>
           <p:cNvSpPr>
             <a:spLocks noGrp="1"/>
           </p:cNvSpPr>
@@ -7434,16 +7796,16 @@
               <a:defRPr/>
             </a:pPr>
             <a:r>
-              <a:rPr lang="es-MX"/>
-              <a:t>Corrección 002</a:t>
-            </a:r>
-            <a:endParaRPr/>
-          </a:p>
-        </p:txBody>
-      </p:sp>
-      <p:sp>
-        <p:nvSpPr>
-          <p:cNvPr id="1323761884" name="Marcador de contenido 2"/>
+              <a:rPr lang="es-MX" sz="2400"/>
+              <a:t>Corrección 006</a:t>
+            </a:r>
+            <a:endParaRPr sz="2400"/>
+          </a:p>
+        </p:txBody>
+      </p:sp>
+      <p:sp>
+        <p:nvSpPr>
+          <p:cNvPr id="2143770494" name="Marcador de contenido 2"/>
           <p:cNvSpPr>
             <a:spLocks noGrp="1"/>
           </p:cNvSpPr>
@@ -7458,7 +7820,9 @@
           </a:xfrm>
         </p:spPr>
         <p:txBody>
-          <a:bodyPr/>
+          <a:bodyPr vertOverflow="overflow" horzOverflow="overflow" vert="horz" wrap="square" lIns="91440" tIns="45720" rIns="91440" bIns="45720" numCol="1" spcCol="0" rtlCol="0" fromWordArt="0" anchor="t" anchorCtr="0" forceAA="0" upright="0" compatLnSpc="0">
+            <a:normAutofit/>
+          </a:bodyPr>
           <a:lstStyle/>
           <a:p>
             <a:pPr marL="0" indent="0">
@@ -7467,7 +7831,7 @@
               <a:defRPr/>
             </a:pPr>
             <a:r>
-              <a:rPr lang="es-ES" sz="2800" b="0" i="0" u="none" strike="noStrike" cap="none" spc="0">
+              <a:rPr lang="es-ES" sz="2400" b="0" i="0" u="none" strike="noStrike" cap="none" spc="0">
                 <a:solidFill>
                   <a:schemeClr val="tx1"/>
                 </a:solidFill>
@@ -7475,9 +7839,9 @@
                 <a:ea typeface="Arial"/>
                 <a:cs typeface="Arial"/>
               </a:rPr>
-              <a:t>rascabonito</a:t>
-            </a:r>
-            <a:endParaRPr lang="es-ES" sz="2800" b="0" i="0" u="none" strike="noStrike" cap="none" spc="0">
+              <a:t>rehogado</a:t>
+            </a:r>
+            <a:endParaRPr sz="2400" b="0" i="0" u="none" strike="noStrike" cap="none" spc="0">
               <a:solidFill>
                 <a:schemeClr val="tx1"/>
               </a:solidFill>
@@ -7492,7 +7856,7 @@
               <a:defRPr/>
             </a:pPr>
             <a:r>
-              <a:rPr lang="es-ES" sz="2800" b="0" i="0" u="none" strike="noStrike" cap="none" spc="0">
+              <a:rPr lang="es-ES" sz="2400" b="0" i="0" u="none" strike="noStrike" cap="none" spc="0">
                 <a:solidFill>
                   <a:schemeClr val="tx1"/>
                 </a:solidFill>
@@ -7502,7 +7866,7 @@
               </a:rPr>
               <a:t>m.</a:t>
             </a:r>
-            <a:endParaRPr lang="es-ES" sz="2800" b="0" i="0" u="none" strike="noStrike" cap="none" spc="0">
+            <a:endParaRPr sz="2400" b="0" i="0" u="none" strike="noStrike" cap="none" spc="0">
               <a:solidFill>
                 <a:schemeClr val="tx1"/>
               </a:solidFill>
@@ -7517,7 +7881,7 @@
               <a:defRPr/>
             </a:pPr>
             <a:r>
-              <a:rPr lang="es-ES" sz="2800" b="0" i="0" u="none" strike="noStrike" cap="none" spc="0">
+              <a:rPr lang="es-ES" sz="2400" b="0" i="0" u="none" strike="noStrike" cap="none" spc="0">
                 <a:solidFill>
                   <a:schemeClr val="tx1"/>
                 </a:solidFill>
@@ -7525,40 +7889,15 @@
                 <a:ea typeface="Arial"/>
                 <a:cs typeface="Arial"/>
               </a:rPr>
-              <a:t>Enfermedad cutánea que produce escozor intenso por una reacción alérgica al parásito calemba: </a:t>
-            </a:r>
-            <a:endParaRPr lang="es-ES" sz="2800" b="0" i="0" u="none" strike="noStrike" cap="none" spc="0">
-              <a:solidFill>
-                <a:schemeClr val="tx1"/>
-              </a:solidFill>
-              <a:latin typeface="Arial"/>
-              <a:cs typeface="Arial"/>
-            </a:endParaRPr>
-          </a:p>
-          <a:p>
-            <a:pPr marL="0" indent="0">
-              <a:buFont typeface="Arial"/>
-              <a:buNone/>
-              <a:defRPr/>
-            </a:pPr>
-            <a:r>
-              <a:rPr lang="es-ES" sz="2800" b="0" i="0" u="none" strike="noStrike" cap="none" spc="0">
-                <a:solidFill>
-                  <a:schemeClr val="tx1"/>
-                </a:solidFill>
-                <a:latin typeface="Arial"/>
-                <a:ea typeface="Arial"/>
-                <a:cs typeface="Arial"/>
-              </a:rPr>
-              <a:t>—Para el rascabonito machaque unas hojas y coloque en la zona donde están los granitos y deje actuar por 5 minutos. Últimas Noticias, 20.04.2011.</a:t>
-            </a:r>
-            <a:endParaRPr/>
-          </a:p>
-        </p:txBody>
-      </p:sp>
-      <p:sp>
-        <p:nvSpPr>
-          <p:cNvPr id="639800224" name=""/>
+              <a:t>Salsa que se usa de base para preparar muchos platos típicos ecuatorianos y que consiste en una mezcla de cebolla, tomate, ajo, hierbas, achiote 3 y, a veces, ají 2, todo finamente picado y frito en manteca: A lo anterior agregue la papa, el choclo, el rehogado y mezcle. INIAP, La magia de la papa nativa: Recetario gastronómico. </a:t>
+            </a:r>
+            <a:endParaRPr sz="2400"/>
+          </a:p>
+        </p:txBody>
+      </p:sp>
+      <p:sp>
+        <p:nvSpPr>
+          <p:cNvPr id="1863999164" name=""/>
           <p:cNvSpPr/>
           <p:nvPr/>
         </p:nvSpPr>
@@ -7587,10 +7926,19 @@
             <a:schemeClr val="lt1"/>
           </a:fontRef>
         </p:style>
+        <p:txBody>
+          <a:bodyPr anchor="ctr"/>
+          <a:p>
+            <a:pPr algn="ctr">
+              <a:defRPr/>
+            </a:pPr>
+            <a:endParaRPr sz="2400"/>
+          </a:p>
+        </p:txBody>
       </p:sp>
       <p:pic>
         <p:nvPicPr>
-          <p:cNvPr id="1712993713" name=""/>
+          <p:cNvPr id="1405517155" name=""/>
           <p:cNvPicPr>
             <a:picLocks noChangeAspect="1"/>
           </p:cNvPicPr>
@@ -7602,8 +7950,8 @@
         </p:blipFill>
         <p:spPr bwMode="auto">
           <a:xfrm>
-            <a:off x="259772" y="-1193717"/>
-            <a:ext cx="3971925" cy="8572500"/>
+            <a:off x="259772" y="-593766"/>
+            <a:ext cx="3914775" cy="8505824"/>
           </a:xfrm>
           <a:prstGeom prst="rect">
             <a:avLst/>
@@ -7645,7 +7993,7 @@
       </p:grpSpPr>
       <p:sp>
         <p:nvSpPr>
-          <p:cNvPr id="1184429718" name="Title 1"/>
+          <p:cNvPr id="1011537149" name="Title 1"/>
           <p:cNvSpPr>
             <a:spLocks noGrp="1"/>
           </p:cNvSpPr>
@@ -7667,16 +8015,16 @@
               <a:defRPr/>
             </a:pPr>
             <a:r>
-              <a:rPr lang="es-MX"/>
-              <a:t>Corrección 002</a:t>
-            </a:r>
-            <a:endParaRPr/>
-          </a:p>
-        </p:txBody>
-      </p:sp>
-      <p:sp>
-        <p:nvSpPr>
-          <p:cNvPr id="1573536615" name="Marcador de contenido 2"/>
+              <a:rPr lang="es-MX" sz="2400"/>
+              <a:t>Corrección 007</a:t>
+            </a:r>
+            <a:endParaRPr sz="2400"/>
+          </a:p>
+        </p:txBody>
+      </p:sp>
+      <p:sp>
+        <p:nvSpPr>
+          <p:cNvPr id="358951038" name="Marcador de contenido 2"/>
           <p:cNvSpPr>
             <a:spLocks noGrp="1"/>
           </p:cNvSpPr>
@@ -7702,7 +8050,7 @@
               <a:defRPr/>
             </a:pPr>
             <a:r>
-              <a:rPr lang="es-ES" sz="2700" b="0" i="0" u="none" strike="noStrike" cap="none" spc="0">
+              <a:rPr lang="es-ES" sz="2400" b="0" i="0" u="none" strike="noStrike" cap="none" spc="0">
                 <a:solidFill>
                   <a:schemeClr val="tx1"/>
                 </a:solidFill>
@@ -7710,9 +8058,9 @@
                 <a:ea typeface="Arial"/>
                 <a:cs typeface="Arial"/>
               </a:rPr>
-              <a:t>rehogado</a:t>
-            </a:r>
-            <a:endParaRPr lang="es-ES" sz="2700" b="0" i="0" u="none" strike="noStrike" cap="none" spc="0">
+              <a:t>horcón</a:t>
+            </a:r>
+            <a:endParaRPr sz="2400" b="0" i="0" u="none" strike="noStrike" cap="none" spc="0">
               <a:solidFill>
                 <a:schemeClr val="tx1"/>
               </a:solidFill>
@@ -7727,7 +8075,7 @@
               <a:defRPr/>
             </a:pPr>
             <a:r>
-              <a:rPr lang="es-ES" sz="2700" b="0" i="0" u="none" strike="noStrike" cap="none" spc="0">
+              <a:rPr lang="es-ES" sz="2400" b="0" i="0" u="none" strike="noStrike" cap="none" spc="0">
                 <a:solidFill>
                   <a:schemeClr val="tx1"/>
                 </a:solidFill>
@@ -7737,12 +8085,11 @@
               </a:rPr>
               <a:t>rur.Ss.Aparato de madera de forma triangular que se pone a los chanchos para que no hocen en terrenos ajenos.:</a:t>
             </a:r>
-            <a:endParaRPr lang="es-ES" sz="2700" b="0" i="0" u="none" strike="noStrike" cap="none" spc="0">
+            <a:endParaRPr sz="2400" b="0" i="0" u="none" strike="noStrike" cap="none" spc="0">
               <a:solidFill>
                 <a:schemeClr val="tx1"/>
               </a:solidFill>
               <a:latin typeface="Arial"/>
-              <a:ea typeface="Arial"/>
               <a:cs typeface="Arial"/>
             </a:endParaRPr>
           </a:p>
@@ -7753,7 +8100,7 @@
               <a:defRPr/>
             </a:pPr>
             <a:r>
-              <a:rPr lang="es-ES" sz="2700" b="0" i="0" u="none" strike="noStrike" cap="none" spc="0">
+              <a:rPr lang="es-ES" sz="2400" b="0" i="0" u="none" strike="noStrike" cap="none" spc="0">
                 <a:solidFill>
                   <a:schemeClr val="tx1"/>
                 </a:solidFill>
@@ -7763,7 +8110,7 @@
               </a:rPr>
               <a:t>— El chancho vio la forma de quitarse el horcón y destruyó las plantaciones vecinas.[Ad hoc.]</a:t>
             </a:r>
-            <a:endParaRPr lang="es-ES" sz="2700" b="0" i="0" u="none" strike="noStrike" cap="none" spc="0">
+            <a:endParaRPr sz="2400" b="0" i="0" u="none" strike="noStrike" cap="none" spc="0">
               <a:solidFill>
                 <a:schemeClr val="tx1"/>
               </a:solidFill>
@@ -7778,7 +8125,7 @@
               <a:defRPr/>
             </a:pPr>
             <a:r>
-              <a:rPr lang="es-ES" sz="2700" b="0" i="0" u="none" strike="noStrike" cap="none" spc="0">
+              <a:rPr lang="es-ES" sz="2400" b="0" i="0" u="none" strike="noStrike" cap="none" spc="0">
                 <a:solidFill>
                   <a:schemeClr val="tx1"/>
                 </a:solidFill>
@@ -7788,13 +8135,13 @@
               </a:rPr>
               <a:t>(Borrar la definición del ejemplo)</a:t>
             </a:r>
-            <a:endParaRPr/>
-          </a:p>
-        </p:txBody>
-      </p:sp>
-      <p:sp>
-        <p:nvSpPr>
-          <p:cNvPr id="460776337" name=""/>
+            <a:endParaRPr sz="2400"/>
+          </a:p>
+        </p:txBody>
+      </p:sp>
+      <p:sp>
+        <p:nvSpPr>
+          <p:cNvPr id="2063993047" name=""/>
           <p:cNvSpPr/>
           <p:nvPr/>
         </p:nvSpPr>
@@ -7823,10 +8170,19 @@
             <a:schemeClr val="lt1"/>
           </a:fontRef>
         </p:style>
+        <p:txBody>
+          <a:bodyPr anchor="ctr"/>
+          <a:p>
+            <a:pPr algn="ctr">
+              <a:defRPr/>
+            </a:pPr>
+            <a:endParaRPr sz="2400"/>
+          </a:p>
+        </p:txBody>
       </p:sp>
       <p:pic>
         <p:nvPicPr>
-          <p:cNvPr id="1774998925" name=""/>
+          <p:cNvPr id="383527939" name=""/>
           <p:cNvPicPr>
             <a:picLocks noChangeAspect="1"/>
           </p:cNvPicPr>
@@ -7838,8 +8194,8 @@
         </p:blipFill>
         <p:spPr bwMode="auto">
           <a:xfrm>
-            <a:off x="259772" y="-606136"/>
-            <a:ext cx="3933824" cy="8534399"/>
+            <a:off x="259772" y="-992898"/>
+            <a:ext cx="3990974" cy="8553449"/>
           </a:xfrm>
           <a:prstGeom prst="rect">
             <a:avLst/>
@@ -7881,7 +8237,7 @@
       </p:grpSpPr>
       <p:sp>
         <p:nvSpPr>
-          <p:cNvPr id="1198202111" name="Title 1"/>
+          <p:cNvPr id="1800307756" name="Title 1"/>
           <p:cNvSpPr>
             <a:spLocks noGrp="1"/>
           </p:cNvSpPr>
@@ -7903,16 +8259,16 @@
               <a:defRPr/>
             </a:pPr>
             <a:r>
-              <a:rPr lang="es-MX"/>
-              <a:t>Corrección 002</a:t>
-            </a:r>
-            <a:endParaRPr/>
-          </a:p>
-        </p:txBody>
-      </p:sp>
-      <p:sp>
-        <p:nvSpPr>
-          <p:cNvPr id="682714965" name="Marcador de contenido 2"/>
+              <a:rPr lang="es-MX" sz="2400"/>
+              <a:t>Corrección 008</a:t>
+            </a:r>
+            <a:endParaRPr sz="2400"/>
+          </a:p>
+        </p:txBody>
+      </p:sp>
+      <p:sp>
+        <p:nvSpPr>
+          <p:cNvPr id="1359860817" name="Marcador de contenido 2"/>
           <p:cNvSpPr>
             <a:spLocks noGrp="1"/>
           </p:cNvSpPr>
@@ -7938,7 +8294,7 @@
               <a:defRPr/>
             </a:pPr>
             <a:r>
-              <a:rPr lang="es-ES" sz="2700" b="0" i="0" u="none" strike="noStrike" cap="none" spc="0">
+              <a:rPr lang="es-ES" sz="2400" b="0" i="0" u="none" strike="noStrike" cap="none" spc="0">
                 <a:solidFill>
                   <a:schemeClr val="tx1"/>
                 </a:solidFill>
@@ -7946,9 +8302,9 @@
                 <a:ea typeface="Arial"/>
                 <a:cs typeface="Arial"/>
               </a:rPr>
-              <a:t>horcón</a:t>
-            </a:r>
-            <a:endParaRPr lang="es-ES" sz="2700" b="0" i="0" u="none" strike="noStrike" cap="none" spc="0">
+              <a:t>hualingo</a:t>
+            </a:r>
+            <a:endParaRPr sz="2400" b="0" i="0" u="none" strike="noStrike" cap="none" spc="0">
               <a:solidFill>
                 <a:schemeClr val="tx1"/>
               </a:solidFill>
@@ -7963,7 +8319,7 @@
               <a:defRPr/>
             </a:pPr>
             <a:r>
-              <a:rPr lang="es-ES" sz="2700" b="0" i="0" u="none" strike="noStrike" cap="none" spc="0">
+              <a:rPr lang="es-ES" sz="2400" b="0" i="0" u="none" strike="noStrike" cap="none" spc="0">
                 <a:solidFill>
                   <a:schemeClr val="tx1"/>
                 </a:solidFill>
@@ -7971,9 +8327,9 @@
                 <a:ea typeface="Arial"/>
                 <a:cs typeface="Arial"/>
               </a:rPr>
-              <a:t>rur.Ss.Aparato de madera de forma triangular que se pone a los chanchos para que no hocen en terrenos ajenos.:</a:t>
-            </a:r>
-            <a:endParaRPr lang="es-ES" sz="2700" b="0" i="0" u="none" strike="noStrike" cap="none" spc="0">
+              <a:t>m.</a:t>
+            </a:r>
+            <a:endParaRPr sz="2400" b="0" i="0" u="none" strike="noStrike" cap="none" spc="0">
               <a:solidFill>
                 <a:schemeClr val="tx1"/>
               </a:solidFill>
@@ -7988,7 +8344,7 @@
               <a:defRPr/>
             </a:pPr>
             <a:r>
-              <a:rPr lang="es-ES" sz="2700" b="0" i="0" u="none" strike="noStrike" cap="none" spc="0">
+              <a:rPr lang="es-ES" sz="2400" b="0" i="0" u="none" strike="noStrike" cap="none" spc="0">
                 <a:solidFill>
                   <a:schemeClr val="tx1"/>
                 </a:solidFill>
@@ -7996,9 +8352,9 @@
                 <a:ea typeface="Arial"/>
                 <a:cs typeface="Arial"/>
               </a:rPr>
-              <a:t>— El chancho vio la forma de quitarse el horcón y destruyó las plantaciones vecinas.[Ad hoc.]</a:t>
-            </a:r>
-            <a:endParaRPr lang="es-ES" sz="2700" b="0" i="0" u="none" strike="noStrike" cap="none" spc="0">
+              <a:t>Referido a una estructura o armazón, inestable, sin firmeza: </a:t>
+            </a:r>
+            <a:endParaRPr sz="2400" b="0" i="0" u="none" strike="noStrike" cap="none" spc="0">
               <a:solidFill>
                 <a:schemeClr val="tx1"/>
               </a:solidFill>
@@ -8013,7 +8369,7 @@
               <a:defRPr/>
             </a:pPr>
             <a:r>
-              <a:rPr lang="es-ES" sz="2700" b="0" i="0" u="none" strike="noStrike" cap="none" spc="0">
+              <a:rPr lang="es-ES" sz="2400" b="0" i="0" u="none" strike="noStrike" cap="none" spc="0">
                 <a:solidFill>
                   <a:schemeClr val="tx1"/>
                 </a:solidFill>
@@ -8021,15 +8377,15 @@
                 <a:ea typeface="Arial"/>
                 <a:cs typeface="Arial"/>
               </a:rPr>
-              <a:t>(Borrar la definición del ejemplo)</a:t>
-            </a:r>
-            <a:endParaRPr/>
-          </a:p>
-        </p:txBody>
-      </p:sp>
-      <p:sp>
-        <p:nvSpPr>
-          <p:cNvPr id="358338379" name=""/>
+              <a:t>—El andamio que se cayó estaba hualingo desde el comienzo.[Ad hoc.]</a:t>
+            </a:r>
+            <a:endParaRPr sz="2400"/>
+          </a:p>
+        </p:txBody>
+      </p:sp>
+      <p:sp>
+        <p:nvSpPr>
+          <p:cNvPr id="115655370" name=""/>
           <p:cNvSpPr/>
           <p:nvPr/>
         </p:nvSpPr>
@@ -8058,10 +8414,19 @@
             <a:schemeClr val="lt1"/>
           </a:fontRef>
         </p:style>
+        <p:txBody>
+          <a:bodyPr anchor="ctr"/>
+          <a:p>
+            <a:pPr algn="ctr">
+              <a:defRPr/>
+            </a:pPr>
+            <a:endParaRPr sz="2400"/>
+          </a:p>
+        </p:txBody>
       </p:sp>
       <p:pic>
         <p:nvPicPr>
-          <p:cNvPr id="256875476" name=""/>
+          <p:cNvPr id="1912287091" name=""/>
           <p:cNvPicPr>
             <a:picLocks noChangeAspect="1"/>
           </p:cNvPicPr>
@@ -8073,8 +8438,8 @@
         </p:blipFill>
         <p:spPr bwMode="auto">
           <a:xfrm>
-            <a:off x="259772" y="-992898"/>
-            <a:ext cx="3990974" cy="8553449"/>
+            <a:off x="259772" y="-556655"/>
+            <a:ext cx="3952874" cy="8543925"/>
           </a:xfrm>
           <a:prstGeom prst="rect">
             <a:avLst/>
@@ -8116,7 +8481,7 @@
       </p:grpSpPr>
       <p:sp>
         <p:nvSpPr>
-          <p:cNvPr id="783966341" name="Title 1"/>
+          <p:cNvPr id="1696707087" name="Title 1"/>
           <p:cNvSpPr>
             <a:spLocks noGrp="1"/>
           </p:cNvSpPr>
@@ -8138,16 +8503,16 @@
               <a:defRPr/>
             </a:pPr>
             <a:r>
-              <a:rPr lang="es-MX"/>
-              <a:t>Corrección 002</a:t>
-            </a:r>
-            <a:endParaRPr/>
-          </a:p>
-        </p:txBody>
-      </p:sp>
-      <p:sp>
-        <p:nvSpPr>
-          <p:cNvPr id="48116076" name="Marcador de contenido 2"/>
+              <a:rPr lang="es-MX" sz="2400"/>
+              <a:t>Corrección 009</a:t>
+            </a:r>
+            <a:endParaRPr sz="2400"/>
+          </a:p>
+        </p:txBody>
+      </p:sp>
+      <p:sp>
+        <p:nvSpPr>
+          <p:cNvPr id="1557211740" name="Marcador de contenido 2"/>
           <p:cNvSpPr>
             <a:spLocks noGrp="1"/>
           </p:cNvSpPr>
@@ -8173,7 +8538,7 @@
               <a:defRPr/>
             </a:pPr>
             <a:r>
-              <a:rPr lang="es-ES" sz="2700" b="0" i="0" u="none" strike="noStrike" cap="none" spc="0">
+              <a:rPr lang="es-ES" sz="2400" b="0" i="0" u="none" strike="noStrike" cap="none" spc="0">
                 <a:solidFill>
                   <a:schemeClr val="tx1"/>
                 </a:solidFill>
@@ -8181,9 +8546,9 @@
                 <a:ea typeface="Arial"/>
                 <a:cs typeface="Arial"/>
               </a:rPr>
-              <a:t>hualingo</a:t>
-            </a:r>
-            <a:endParaRPr lang="es-ES" sz="2700" b="0" i="0" u="none" strike="noStrike" cap="none" spc="0">
+              <a:t>rayado</a:t>
+            </a:r>
+            <a:endParaRPr sz="2400" b="0" i="0" u="none" strike="noStrike" cap="none" spc="0">
               <a:solidFill>
                 <a:schemeClr val="tx1"/>
               </a:solidFill>
@@ -8198,7 +8563,7 @@
               <a:defRPr/>
             </a:pPr>
             <a:r>
-              <a:rPr lang="es-ES" sz="2700" b="0" i="0" u="none" strike="noStrike" cap="none" spc="0">
+              <a:rPr lang="es-ES" sz="2400" b="0" i="0" u="none" strike="noStrike" cap="none" spc="0">
                 <a:solidFill>
                   <a:schemeClr val="tx1"/>
                 </a:solidFill>
@@ -8206,9 +8571,9 @@
                 <a:ea typeface="Arial"/>
                 <a:cs typeface="Arial"/>
               </a:rPr>
-              <a:t>m.</a:t>
-            </a:r>
-            <a:endParaRPr lang="es-ES" sz="2700" b="0" i="0" u="none" strike="noStrike" cap="none" spc="0">
+              <a:t>2. pop. Persona que llama la atención por tener una forma extraña y extravagante de actuar o de vestir: </a:t>
+            </a:r>
+            <a:endParaRPr sz="2400" b="0" i="0" u="none" strike="noStrike" cap="none" spc="0">
               <a:solidFill>
                 <a:schemeClr val="tx1"/>
               </a:solidFill>
@@ -8223,7 +8588,7 @@
               <a:defRPr/>
             </a:pPr>
             <a:r>
-              <a:rPr lang="es-ES" sz="2700" b="0" i="0" u="none" strike="noStrike" cap="none" spc="0">
+              <a:rPr lang="es-ES" sz="2400" b="0" i="0" u="none" strike="noStrike" cap="none" spc="0">
                 <a:solidFill>
                   <a:schemeClr val="tx1"/>
                 </a:solidFill>
@@ -8231,9 +8596,9 @@
                 <a:ea typeface="Arial"/>
                 <a:cs typeface="Arial"/>
               </a:rPr>
-              <a:t>Referido a una estructura o armazón, inestable, sin firmeza: </a:t>
-            </a:r>
-            <a:endParaRPr lang="es-ES" sz="2700" b="0" i="0" u="none" strike="noStrike" cap="none" spc="0">
+              <a:t>—Melena, pantalones raídos, chompa de cuero vieja, el Fuete Monsalve nunca dejó de parecer y ser un rayado.[Ad hoc.]</a:t>
+            </a:r>
+            <a:endParaRPr sz="2400" b="0" i="0" u="none" strike="noStrike" cap="none" spc="0">
               <a:solidFill>
                 <a:schemeClr val="tx1"/>
               </a:solidFill>
@@ -8248,7 +8613,7 @@
               <a:defRPr/>
             </a:pPr>
             <a:r>
-              <a:rPr lang="es-ES" sz="2700" b="0" i="0" u="none" strike="noStrike" cap="none" spc="0">
+              <a:rPr lang="es-ES" sz="2400" b="0" i="0" u="none" strike="noStrike" cap="none" spc="0">
                 <a:solidFill>
                   <a:schemeClr val="tx1"/>
                 </a:solidFill>
@@ -8256,15 +8621,15 @@
                 <a:ea typeface="Arial"/>
                 <a:cs typeface="Arial"/>
               </a:rPr>
-              <a:t>—El andamio que se cayó estaba hualingo desde el comienzo.[Ad hoc.]</a:t>
-            </a:r>
-            <a:endParaRPr/>
-          </a:p>
-        </p:txBody>
-      </p:sp>
-      <p:sp>
-        <p:nvSpPr>
-          <p:cNvPr id="1376877502" name=""/>
+              <a:t>(Borrar la definición del ejemplo)</a:t>
+            </a:r>
+            <a:endParaRPr sz="2400"/>
+          </a:p>
+        </p:txBody>
+      </p:sp>
+      <p:sp>
+        <p:nvSpPr>
+          <p:cNvPr id="2038143610" name=""/>
           <p:cNvSpPr/>
           <p:nvPr/>
         </p:nvSpPr>
@@ -8293,10 +8658,19 @@
             <a:schemeClr val="lt1"/>
           </a:fontRef>
         </p:style>
+        <p:txBody>
+          <a:bodyPr anchor="ctr"/>
+          <a:p>
+            <a:pPr algn="ctr">
+              <a:defRPr/>
+            </a:pPr>
+            <a:endParaRPr sz="2400"/>
+          </a:p>
+        </p:txBody>
       </p:sp>
       <p:pic>
         <p:nvPicPr>
-          <p:cNvPr id="291884122" name=""/>
+          <p:cNvPr id="1711704955" name=""/>
           <p:cNvPicPr>
             <a:picLocks noChangeAspect="1"/>
           </p:cNvPicPr>
@@ -8308,8 +8682,8 @@
         </p:blipFill>
         <p:spPr bwMode="auto">
           <a:xfrm>
-            <a:off x="259772" y="-556655"/>
-            <a:ext cx="3952874" cy="8543925"/>
+            <a:off x="259772" y="-729837"/>
+            <a:ext cx="3924299" cy="8543925"/>
           </a:xfrm>
           <a:prstGeom prst="rect">
             <a:avLst/>

</xml_diff>